<commit_message>
Complete Report and Presentation
</commit_message>
<xml_diff>
--- a/Data Mining presentation.pptx
+++ b/Data Mining presentation.pptx
@@ -207,7 +207,7 @@
           <a:p>
             <a:fld id="{E1D76724-6684-4474-AC7D-B2BAA2DF309E}" type="datetimeFigureOut">
               <a:rPr lang="en-GB" smtClean="0"/>
-              <a:t>18/04/2020</a:t>
+              <a:t>05/05/2020</a:t>
             </a:fld>
             <a:endParaRPr lang="en-GB"/>
           </a:p>
@@ -980,7 +980,7 @@
           <a:p>
             <a:fld id="{9184DA70-C731-4C70-880D-CCD4705E623C}" type="datetime1">
               <a:rPr lang="en-US" smtClean="0"/>
-              <a:t>4/18/2020</a:t>
+              <a:t>5/5/2020</a:t>
             </a:fld>
             <a:endParaRPr lang="en-US" dirty="0"/>
           </a:p>
@@ -1168,7 +1168,7 @@
           <a:p>
             <a:fld id="{B612A279-0833-481D-8C56-F67FD0AC6C50}" type="datetime1">
               <a:rPr lang="en-US" smtClean="0"/>
-              <a:t>4/18/2020</a:t>
+              <a:t>5/5/2020</a:t>
             </a:fld>
             <a:endParaRPr lang="en-US" dirty="0"/>
           </a:p>
@@ -1410,7 +1410,7 @@
           <a:p>
             <a:fld id="{6587DA83-5663-4C9C-B9AA-0B40A3DAFF81}" type="datetime1">
               <a:rPr lang="en-US" smtClean="0"/>
-              <a:t>4/18/2020</a:t>
+              <a:t>5/5/2020</a:t>
             </a:fld>
             <a:endParaRPr lang="en-US" dirty="0"/>
           </a:p>
@@ -1598,7 +1598,7 @@
           <a:p>
             <a:fld id="{4BE1D723-8F53-4F53-90B0-1982A396982E}" type="datetime1">
               <a:rPr lang="en-US" smtClean="0"/>
-              <a:t>4/18/2020</a:t>
+              <a:t>5/5/2020</a:t>
             </a:fld>
             <a:endParaRPr lang="en-US" dirty="0"/>
           </a:p>
@@ -1971,7 +1971,7 @@
           <a:p>
             <a:fld id="{97669AF7-7BEB-44E4-9852-375E34362B5B}" type="datetime1">
               <a:rPr lang="en-US" smtClean="0"/>
-              <a:t>4/18/2020</a:t>
+              <a:t>5/5/2020</a:t>
             </a:fld>
             <a:endParaRPr lang="en-US" dirty="0"/>
           </a:p>
@@ -2226,7 +2226,7 @@
           <a:p>
             <a:fld id="{BAAAC38D-0552-4C82-B593-E6124DFADBE2}" type="datetime1">
               <a:rPr lang="en-US" smtClean="0"/>
-              <a:t>4/18/2020</a:t>
+              <a:t>5/5/2020</a:t>
             </a:fld>
             <a:endParaRPr lang="en-US" dirty="0"/>
           </a:p>
@@ -2623,7 +2623,7 @@
           <a:p>
             <a:fld id="{D9DF0F1C-5577-4ACB-BB62-DF8F3C494C7E}" type="datetime1">
               <a:rPr lang="en-US" smtClean="0"/>
-              <a:t>4/18/2020</a:t>
+              <a:t>5/5/2020</a:t>
             </a:fld>
             <a:endParaRPr lang="en-US" dirty="0"/>
           </a:p>
@@ -2759,7 +2759,7 @@
           <a:p>
             <a:fld id="{1775B394-D9F9-4F0C-B15D-605F45CB9E9F}" type="datetime1">
               <a:rPr lang="en-US" smtClean="0"/>
-              <a:t>4/18/2020</a:t>
+              <a:t>5/5/2020</a:t>
             </a:fld>
             <a:endParaRPr lang="en-US" dirty="0"/>
           </a:p>
@@ -2916,7 +2916,7 @@
           <a:p>
             <a:fld id="{39667345-2558-425A-8533-9BFDBCE15005}" type="datetime1">
               <a:rPr lang="en-US" smtClean="0"/>
-              <a:t>4/18/2020</a:t>
+              <a:t>5/5/2020</a:t>
             </a:fld>
             <a:endParaRPr lang="en-US" dirty="0"/>
           </a:p>
@@ -3245,7 +3245,7 @@
           <a:p>
             <a:fld id="{92BEA474-078D-4E9B-9B14-09A87B19DC46}" type="datetime1">
               <a:rPr lang="en-US" smtClean="0"/>
-              <a:t>4/18/2020</a:t>
+              <a:t>5/5/2020</a:t>
             </a:fld>
             <a:endParaRPr lang="en-US" dirty="0"/>
           </a:p>
@@ -3595,7 +3595,7 @@
           <a:p>
             <a:fld id="{4907D986-8816-4272-A432-0437A28A9828}" type="datetime1">
               <a:rPr lang="en-US" smtClean="0"/>
-              <a:t>4/18/2020</a:t>
+              <a:t>5/5/2020</a:t>
             </a:fld>
             <a:endParaRPr lang="en-US" dirty="0"/>
           </a:p>
@@ -3856,7 +3856,7 @@
           <a:p>
             <a:fld id="{62D6E202-B606-4609-B914-27C9371A1F6D}" type="datetime1">
               <a:rPr lang="en-US" smtClean="0"/>
-              <a:t>4/18/2020</a:t>
+              <a:t>5/5/2020</a:t>
             </a:fld>
             <a:endParaRPr lang="en-US" dirty="0"/>
           </a:p>
@@ -5896,15 +5896,378 @@
             <p:ph idx="1"/>
           </p:nvPr>
         </p:nvSpPr>
-        <p:spPr/>
-        <p:txBody>
-          <a:bodyPr/>
-          <a:lstStyle/>
-          <a:p>
-            <a:endParaRPr lang="en-GB"/>
-          </a:p>
-        </p:txBody>
-      </p:sp>
+        <p:spPr>
+          <a:xfrm>
+            <a:off x="1097280" y="2108201"/>
+            <a:ext cx="1033361" cy="377547"/>
+          </a:xfrm>
+        </p:spPr>
+        <p:txBody>
+          <a:bodyPr>
+            <a:normAutofit lnSpcReduction="10000"/>
+          </a:bodyPr>
+          <a:lstStyle/>
+          <a:p>
+            <a:r>
+              <a:rPr lang="en-GB" dirty="0"/>
+              <a:t>Rules</a:t>
+            </a:r>
+          </a:p>
+        </p:txBody>
+      </p:sp>
+      <p:pic>
+        <p:nvPicPr>
+          <p:cNvPr id="4" name="Picture 3">
+            <a:extLst>
+              <a:ext uri="{FF2B5EF4-FFF2-40B4-BE49-F238E27FC236}">
+                <a16:creationId xmlns:a16="http://schemas.microsoft.com/office/drawing/2014/main" id="{8C8164D3-FFA6-4BF4-AEC0-852691780794}"/>
+              </a:ext>
+            </a:extLst>
+          </p:cNvPr>
+          <p:cNvPicPr>
+            <a:picLocks noChangeAspect="1"/>
+          </p:cNvPicPr>
+          <p:nvPr/>
+        </p:nvPicPr>
+        <p:blipFill>
+          <a:blip r:embed="rId2"/>
+          <a:stretch>
+            <a:fillRect/>
+          </a:stretch>
+        </p:blipFill>
+        <p:spPr>
+          <a:xfrm>
+            <a:off x="1177179" y="2504164"/>
+            <a:ext cx="8401050" cy="704850"/>
+          </a:xfrm>
+          <a:prstGeom prst="rect">
+            <a:avLst/>
+          </a:prstGeom>
+        </p:spPr>
+      </p:pic>
+      <p:grpSp>
+        <p:nvGrpSpPr>
+          <p:cNvPr id="7" name="Group 6">
+            <a:extLst>
+              <a:ext uri="{FF2B5EF4-FFF2-40B4-BE49-F238E27FC236}">
+                <a16:creationId xmlns:a16="http://schemas.microsoft.com/office/drawing/2014/main" id="{9FCCC6C8-F5CA-494B-97D4-DF5EED3EFDAB}"/>
+              </a:ext>
+            </a:extLst>
+          </p:cNvPr>
+          <p:cNvGrpSpPr/>
+          <p:nvPr/>
+        </p:nvGrpSpPr>
+        <p:grpSpPr>
+          <a:xfrm>
+            <a:off x="1097280" y="3598271"/>
+            <a:ext cx="2708799" cy="1390979"/>
+            <a:chOff x="1097280" y="3598271"/>
+            <a:chExt cx="2708799" cy="1390979"/>
+          </a:xfrm>
+        </p:grpSpPr>
+        <p:pic>
+          <p:nvPicPr>
+            <p:cNvPr id="5" name="Picture 4">
+              <a:extLst>
+                <a:ext uri="{FF2B5EF4-FFF2-40B4-BE49-F238E27FC236}">
+                  <a16:creationId xmlns:a16="http://schemas.microsoft.com/office/drawing/2014/main" id="{BDA43AE2-2F09-4299-86E5-7C5CA1F25107}"/>
+                </a:ext>
+              </a:extLst>
+            </p:cNvPr>
+            <p:cNvPicPr>
+              <a:picLocks noChangeAspect="1"/>
+            </p:cNvPicPr>
+            <p:nvPr/>
+          </p:nvPicPr>
+          <p:blipFill rotWithShape="1">
+            <a:blip r:embed="rId3"/>
+            <a:srcRect l="338" t="5673" r="-338" b="57385"/>
+            <a:stretch/>
+          </p:blipFill>
+          <p:spPr>
+            <a:xfrm>
+              <a:off x="1177179" y="3975818"/>
+              <a:ext cx="2628900" cy="1013432"/>
+            </a:xfrm>
+            <a:prstGeom prst="rect">
+              <a:avLst/>
+            </a:prstGeom>
+          </p:spPr>
+        </p:pic>
+        <p:sp>
+          <p:nvSpPr>
+            <p:cNvPr id="6" name="Content Placeholder 2">
+              <a:extLst>
+                <a:ext uri="{FF2B5EF4-FFF2-40B4-BE49-F238E27FC236}">
+                  <a16:creationId xmlns:a16="http://schemas.microsoft.com/office/drawing/2014/main" id="{5BE7C1C9-F54D-4A9D-941E-1360654145A0}"/>
+                </a:ext>
+              </a:extLst>
+            </p:cNvPr>
+            <p:cNvSpPr txBox="1">
+              <a:spLocks/>
+            </p:cNvSpPr>
+            <p:nvPr/>
+          </p:nvSpPr>
+          <p:spPr>
+            <a:xfrm>
+              <a:off x="1097280" y="3598271"/>
+              <a:ext cx="1992149" cy="377547"/>
+            </a:xfrm>
+            <a:prstGeom prst="rect">
+              <a:avLst/>
+            </a:prstGeom>
+          </p:spPr>
+          <p:txBody>
+            <a:bodyPr vert="horz" lIns="0" tIns="45720" rIns="0" bIns="45720" rtlCol="0">
+              <a:normAutofit fontScale="92500" lnSpcReduction="10000"/>
+            </a:bodyPr>
+            <a:lstStyle>
+              <a:lvl1pPr marL="91440" indent="-91440" algn="l" defTabSz="914400" rtl="0" eaLnBrk="1" latinLnBrk="0" hangingPunct="1">
+                <a:lnSpc>
+                  <a:spcPct val="100000"/>
+                </a:lnSpc>
+                <a:spcBef>
+                  <a:spcPts val="1200"/>
+                </a:spcBef>
+                <a:spcAft>
+                  <a:spcPts val="200"/>
+                </a:spcAft>
+                <a:buClr>
+                  <a:schemeClr val="accent1"/>
+                </a:buClr>
+                <a:buSzPct val="100000"/>
+                <a:buFont typeface="Calibri" panose="020F0502020204030204" pitchFamily="34" charset="0"/>
+                <a:buChar char=" "/>
+                <a:defRPr sz="2000" kern="1200">
+                  <a:solidFill>
+                    <a:schemeClr val="tx1">
+                      <a:lumMod val="75000"/>
+                      <a:lumOff val="25000"/>
+                    </a:schemeClr>
+                  </a:solidFill>
+                  <a:latin typeface="+mn-lt"/>
+                  <a:ea typeface="+mn-ea"/>
+                  <a:cs typeface="+mn-cs"/>
+                </a:defRPr>
+              </a:lvl1pPr>
+              <a:lvl2pPr marL="384048" indent="-182880" algn="l" defTabSz="914400" rtl="0" eaLnBrk="1" latinLnBrk="0" hangingPunct="1">
+                <a:lnSpc>
+                  <a:spcPct val="100000"/>
+                </a:lnSpc>
+                <a:spcBef>
+                  <a:spcPts val="200"/>
+                </a:spcBef>
+                <a:spcAft>
+                  <a:spcPts val="400"/>
+                </a:spcAft>
+                <a:buClrTx/>
+                <a:buFont typeface="Calibri" pitchFamily="34" charset="0"/>
+                <a:buChar char="◦"/>
+                <a:defRPr sz="1800" kern="1200">
+                  <a:solidFill>
+                    <a:schemeClr val="tx1">
+                      <a:lumMod val="75000"/>
+                      <a:lumOff val="25000"/>
+                    </a:schemeClr>
+                  </a:solidFill>
+                  <a:latin typeface="+mn-lt"/>
+                  <a:ea typeface="+mn-ea"/>
+                  <a:cs typeface="+mn-cs"/>
+                </a:defRPr>
+              </a:lvl2pPr>
+              <a:lvl3pPr marL="566928" indent="-182880" algn="l" defTabSz="914400" rtl="0" eaLnBrk="1" latinLnBrk="0" hangingPunct="1">
+                <a:lnSpc>
+                  <a:spcPct val="100000"/>
+                </a:lnSpc>
+                <a:spcBef>
+                  <a:spcPts val="200"/>
+                </a:spcBef>
+                <a:spcAft>
+                  <a:spcPts val="400"/>
+                </a:spcAft>
+                <a:buClrTx/>
+                <a:buFont typeface="Calibri" pitchFamily="34" charset="0"/>
+                <a:buChar char="◦"/>
+                <a:defRPr sz="1400" kern="1200">
+                  <a:solidFill>
+                    <a:schemeClr val="tx1">
+                      <a:lumMod val="75000"/>
+                      <a:lumOff val="25000"/>
+                    </a:schemeClr>
+                  </a:solidFill>
+                  <a:latin typeface="+mn-lt"/>
+                  <a:ea typeface="+mn-ea"/>
+                  <a:cs typeface="+mn-cs"/>
+                </a:defRPr>
+              </a:lvl3pPr>
+              <a:lvl4pPr marL="749808" indent="-182880" algn="l" defTabSz="914400" rtl="0" eaLnBrk="1" latinLnBrk="0" hangingPunct="1">
+                <a:lnSpc>
+                  <a:spcPct val="100000"/>
+                </a:lnSpc>
+                <a:spcBef>
+                  <a:spcPts val="200"/>
+                </a:spcBef>
+                <a:spcAft>
+                  <a:spcPts val="400"/>
+                </a:spcAft>
+                <a:buClrTx/>
+                <a:buFont typeface="Calibri" pitchFamily="34" charset="0"/>
+                <a:buChar char="◦"/>
+                <a:defRPr sz="1400" kern="1200">
+                  <a:solidFill>
+                    <a:schemeClr val="tx1">
+                      <a:lumMod val="75000"/>
+                      <a:lumOff val="25000"/>
+                    </a:schemeClr>
+                  </a:solidFill>
+                  <a:latin typeface="+mn-lt"/>
+                  <a:ea typeface="+mn-ea"/>
+                  <a:cs typeface="+mn-cs"/>
+                </a:defRPr>
+              </a:lvl4pPr>
+              <a:lvl5pPr marL="932688" indent="-182880" algn="l" defTabSz="914400" rtl="0" eaLnBrk="1" latinLnBrk="0" hangingPunct="1">
+                <a:lnSpc>
+                  <a:spcPct val="100000"/>
+                </a:lnSpc>
+                <a:spcBef>
+                  <a:spcPts val="200"/>
+                </a:spcBef>
+                <a:spcAft>
+                  <a:spcPts val="400"/>
+                </a:spcAft>
+                <a:buClrTx/>
+                <a:buFont typeface="Calibri" pitchFamily="34" charset="0"/>
+                <a:buChar char="◦"/>
+                <a:defRPr sz="1400" kern="1200">
+                  <a:solidFill>
+                    <a:schemeClr val="tx1">
+                      <a:lumMod val="75000"/>
+                      <a:lumOff val="25000"/>
+                    </a:schemeClr>
+                  </a:solidFill>
+                  <a:latin typeface="+mn-lt"/>
+                  <a:ea typeface="+mn-ea"/>
+                  <a:cs typeface="+mn-cs"/>
+                </a:defRPr>
+              </a:lvl5pPr>
+              <a:lvl6pPr marL="1100000" indent="-228600" algn="l" defTabSz="914400" rtl="0" eaLnBrk="1" latinLnBrk="0" hangingPunct="1">
+                <a:lnSpc>
+                  <a:spcPct val="90000"/>
+                </a:lnSpc>
+                <a:spcBef>
+                  <a:spcPts val="200"/>
+                </a:spcBef>
+                <a:spcAft>
+                  <a:spcPts val="400"/>
+                </a:spcAft>
+                <a:buClr>
+                  <a:schemeClr val="accent1"/>
+                </a:buClr>
+                <a:buFont typeface="Calibri" pitchFamily="34" charset="0"/>
+                <a:buChar char="◦"/>
+                <a:defRPr sz="1400" kern="1200">
+                  <a:solidFill>
+                    <a:schemeClr val="tx1">
+                      <a:lumMod val="75000"/>
+                      <a:lumOff val="25000"/>
+                    </a:schemeClr>
+                  </a:solidFill>
+                  <a:latin typeface="+mn-lt"/>
+                  <a:ea typeface="+mn-ea"/>
+                  <a:cs typeface="+mn-cs"/>
+                </a:defRPr>
+              </a:lvl6pPr>
+              <a:lvl7pPr marL="1300000" indent="-228600" algn="l" defTabSz="914400" rtl="0" eaLnBrk="1" latinLnBrk="0" hangingPunct="1">
+                <a:lnSpc>
+                  <a:spcPct val="90000"/>
+                </a:lnSpc>
+                <a:spcBef>
+                  <a:spcPts val="200"/>
+                </a:spcBef>
+                <a:spcAft>
+                  <a:spcPts val="400"/>
+                </a:spcAft>
+                <a:buClr>
+                  <a:schemeClr val="accent1"/>
+                </a:buClr>
+                <a:buFont typeface="Calibri" pitchFamily="34" charset="0"/>
+                <a:buChar char="◦"/>
+                <a:defRPr sz="1400" kern="1200">
+                  <a:solidFill>
+                    <a:schemeClr val="tx1">
+                      <a:lumMod val="75000"/>
+                      <a:lumOff val="25000"/>
+                    </a:schemeClr>
+                  </a:solidFill>
+                  <a:latin typeface="+mn-lt"/>
+                  <a:ea typeface="+mn-ea"/>
+                  <a:cs typeface="+mn-cs"/>
+                </a:defRPr>
+              </a:lvl7pPr>
+              <a:lvl8pPr marL="1500000" indent="-228600" algn="l" defTabSz="914400" rtl="0" eaLnBrk="1" latinLnBrk="0" hangingPunct="1">
+                <a:lnSpc>
+                  <a:spcPct val="90000"/>
+                </a:lnSpc>
+                <a:spcBef>
+                  <a:spcPts val="200"/>
+                </a:spcBef>
+                <a:spcAft>
+                  <a:spcPts val="400"/>
+                </a:spcAft>
+                <a:buClr>
+                  <a:schemeClr val="accent1"/>
+                </a:buClr>
+                <a:buFont typeface="Calibri" pitchFamily="34" charset="0"/>
+                <a:buChar char="◦"/>
+                <a:defRPr sz="1400" kern="1200">
+                  <a:solidFill>
+                    <a:schemeClr val="tx1">
+                      <a:lumMod val="75000"/>
+                      <a:lumOff val="25000"/>
+                    </a:schemeClr>
+                  </a:solidFill>
+                  <a:latin typeface="+mn-lt"/>
+                  <a:ea typeface="+mn-ea"/>
+                  <a:cs typeface="+mn-cs"/>
+                </a:defRPr>
+              </a:lvl8pPr>
+              <a:lvl9pPr marL="1700000" indent="-228600" algn="l" defTabSz="914400" rtl="0" eaLnBrk="1" latinLnBrk="0" hangingPunct="1">
+                <a:lnSpc>
+                  <a:spcPct val="90000"/>
+                </a:lnSpc>
+                <a:spcBef>
+                  <a:spcPts val="200"/>
+                </a:spcBef>
+                <a:spcAft>
+                  <a:spcPts val="400"/>
+                </a:spcAft>
+                <a:buClr>
+                  <a:schemeClr val="accent1"/>
+                </a:buClr>
+                <a:buFont typeface="Calibri" pitchFamily="34" charset="0"/>
+                <a:buChar char="◦"/>
+                <a:defRPr sz="1400" kern="1200">
+                  <a:solidFill>
+                    <a:schemeClr val="tx1">
+                      <a:lumMod val="75000"/>
+                      <a:lumOff val="25000"/>
+                    </a:schemeClr>
+                  </a:solidFill>
+                  <a:latin typeface="+mn-lt"/>
+                  <a:ea typeface="+mn-ea"/>
+                  <a:cs typeface="+mn-cs"/>
+                </a:defRPr>
+              </a:lvl9pPr>
+            </a:lstStyle>
+            <a:p>
+              <a:r>
+                <a:rPr lang="en-GB" dirty="0"/>
+                <a:t>Frequent Itemsets</a:t>
+              </a:r>
+            </a:p>
+          </p:txBody>
+        </p:sp>
+      </p:grpSp>
     </p:spTree>
     <p:extLst>
       <p:ext uri="{BB962C8B-B14F-4D97-AF65-F5344CB8AC3E}">

</xml_diff>

<commit_message>
Pretified Presentation with some Images
</commit_message>
<xml_diff>
--- a/Data Mining presentation.pptx
+++ b/Data Mining presentation.pptx
@@ -206,7 +206,7 @@
           <a:p>
             <a:fld id="{E1D76724-6684-4474-AC7D-B2BAA2DF309E}" type="datetimeFigureOut">
               <a:rPr lang="en-GB" smtClean="0"/>
-              <a:t>05/05/2020</a:t>
+              <a:t>07/05/2020</a:t>
             </a:fld>
             <a:endParaRPr lang="en-GB"/>
           </a:p>
@@ -735,6 +735,101 @@
 </p:notes>
 </file>
 
+<file path=ppt/notesSlides/notesSlide4.xml><?xml version="1.0" encoding="utf-8"?>
+<p:notes xmlns:a="http://schemas.openxmlformats.org/drawingml/2006/main" xmlns:r="http://schemas.openxmlformats.org/officeDocument/2006/relationships" xmlns:p="http://schemas.openxmlformats.org/presentationml/2006/main">
+  <p:cSld>
+    <p:spTree>
+      <p:nvGrpSpPr>
+        <p:cNvPr id="1" name=""/>
+        <p:cNvGrpSpPr/>
+        <p:nvPr/>
+      </p:nvGrpSpPr>
+      <p:grpSpPr>
+        <a:xfrm>
+          <a:off x="0" y="0"/>
+          <a:ext cx="0" cy="0"/>
+          <a:chOff x="0" y="0"/>
+          <a:chExt cx="0" cy="0"/>
+        </a:xfrm>
+      </p:grpSpPr>
+      <p:sp>
+        <p:nvSpPr>
+          <p:cNvPr id="2" name="Slide Image Placeholder 1"/>
+          <p:cNvSpPr>
+            <a:spLocks noGrp="1" noRot="1" noChangeAspect="1"/>
+          </p:cNvSpPr>
+          <p:nvPr>
+            <p:ph type="sldImg"/>
+          </p:nvPr>
+        </p:nvSpPr>
+        <p:spPr/>
+      </p:sp>
+      <p:sp>
+        <p:nvSpPr>
+          <p:cNvPr id="3" name="Notes Placeholder 2"/>
+          <p:cNvSpPr>
+            <a:spLocks noGrp="1"/>
+          </p:cNvSpPr>
+          <p:nvPr>
+            <p:ph type="body" idx="1"/>
+          </p:nvPr>
+        </p:nvSpPr>
+        <p:spPr/>
+        <p:txBody>
+          <a:bodyPr/>
+          <a:lstStyle/>
+          <a:p>
+            <a:r>
+              <a:rPr lang="en-GB" dirty="0"/>
+              <a:t>There are 169 unique items discovered by the </a:t>
+            </a:r>
+            <a:r>
+              <a:rPr lang="en-GB" dirty="0" err="1"/>
+              <a:t>Apriori</a:t>
+            </a:r>
+            <a:r>
+              <a:rPr lang="en-GB" dirty="0"/>
+              <a:t> algorithm, out of which thousands of rules were generated. </a:t>
+            </a:r>
+          </a:p>
+        </p:txBody>
+      </p:sp>
+      <p:sp>
+        <p:nvSpPr>
+          <p:cNvPr id="4" name="Slide Number Placeholder 3"/>
+          <p:cNvSpPr>
+            <a:spLocks noGrp="1"/>
+          </p:cNvSpPr>
+          <p:nvPr>
+            <p:ph type="sldNum" sz="quarter" idx="5"/>
+          </p:nvPr>
+        </p:nvSpPr>
+        <p:spPr/>
+        <p:txBody>
+          <a:bodyPr/>
+          <a:lstStyle/>
+          <a:p>
+            <a:fld id="{56968897-611B-4557-97B4-67EAE2B1ABE0}" type="slidenum">
+              <a:rPr lang="en-GB" smtClean="0"/>
+              <a:t>6</a:t>
+            </a:fld>
+            <a:endParaRPr lang="en-GB"/>
+          </a:p>
+        </p:txBody>
+      </p:sp>
+    </p:spTree>
+    <p:extLst>
+      <p:ext uri="{BB962C8B-B14F-4D97-AF65-F5344CB8AC3E}">
+        <p14:creationId xmlns:p14="http://schemas.microsoft.com/office/powerpoint/2010/main" val="2730601008"/>
+      </p:ext>
+    </p:extLst>
+  </p:cSld>
+  <p:clrMapOvr>
+    <a:masterClrMapping/>
+  </p:clrMapOvr>
+</p:notes>
+</file>
+
 <file path=ppt/slideLayouts/slideLayout1.xml><?xml version="1.0" encoding="utf-8"?>
 <p:sldLayout xmlns:a="http://schemas.openxmlformats.org/drawingml/2006/main" xmlns:r="http://schemas.openxmlformats.org/officeDocument/2006/relationships" xmlns:p="http://schemas.openxmlformats.org/presentationml/2006/main" showMasterSp="0" type="title" preserve="1">
   <p:cSld name="Title Slide">
@@ -979,7 +1074,7 @@
           <a:p>
             <a:fld id="{9184DA70-C731-4C70-880D-CCD4705E623C}" type="datetime1">
               <a:rPr lang="en-US" smtClean="0"/>
-              <a:t>5/5/2020</a:t>
+              <a:t>5/7/2020</a:t>
             </a:fld>
             <a:endParaRPr lang="en-US" dirty="0"/>
           </a:p>
@@ -1167,7 +1262,7 @@
           <a:p>
             <a:fld id="{B612A279-0833-481D-8C56-F67FD0AC6C50}" type="datetime1">
               <a:rPr lang="en-US" smtClean="0"/>
-              <a:t>5/5/2020</a:t>
+              <a:t>5/7/2020</a:t>
             </a:fld>
             <a:endParaRPr lang="en-US" dirty="0"/>
           </a:p>
@@ -1409,7 +1504,7 @@
           <a:p>
             <a:fld id="{6587DA83-5663-4C9C-B9AA-0B40A3DAFF81}" type="datetime1">
               <a:rPr lang="en-US" smtClean="0"/>
-              <a:t>5/5/2020</a:t>
+              <a:t>5/7/2020</a:t>
             </a:fld>
             <a:endParaRPr lang="en-US" dirty="0"/>
           </a:p>
@@ -1597,7 +1692,7 @@
           <a:p>
             <a:fld id="{4BE1D723-8F53-4F53-90B0-1982A396982E}" type="datetime1">
               <a:rPr lang="en-US" smtClean="0"/>
-              <a:t>5/5/2020</a:t>
+              <a:t>5/7/2020</a:t>
             </a:fld>
             <a:endParaRPr lang="en-US" dirty="0"/>
           </a:p>
@@ -1970,7 +2065,7 @@
           <a:p>
             <a:fld id="{97669AF7-7BEB-44E4-9852-375E34362B5B}" type="datetime1">
               <a:rPr lang="en-US" smtClean="0"/>
-              <a:t>5/5/2020</a:t>
+              <a:t>5/7/2020</a:t>
             </a:fld>
             <a:endParaRPr lang="en-US" dirty="0"/>
           </a:p>
@@ -2225,7 +2320,7 @@
           <a:p>
             <a:fld id="{BAAAC38D-0552-4C82-B593-E6124DFADBE2}" type="datetime1">
               <a:rPr lang="en-US" smtClean="0"/>
-              <a:t>5/5/2020</a:t>
+              <a:t>5/7/2020</a:t>
             </a:fld>
             <a:endParaRPr lang="en-US" dirty="0"/>
           </a:p>
@@ -2622,7 +2717,7 @@
           <a:p>
             <a:fld id="{D9DF0F1C-5577-4ACB-BB62-DF8F3C494C7E}" type="datetime1">
               <a:rPr lang="en-US" smtClean="0"/>
-              <a:t>5/5/2020</a:t>
+              <a:t>5/7/2020</a:t>
             </a:fld>
             <a:endParaRPr lang="en-US" dirty="0"/>
           </a:p>
@@ -2758,7 +2853,7 @@
           <a:p>
             <a:fld id="{1775B394-D9F9-4F0C-B15D-605F45CB9E9F}" type="datetime1">
               <a:rPr lang="en-US" smtClean="0"/>
-              <a:t>5/5/2020</a:t>
+              <a:t>5/7/2020</a:t>
             </a:fld>
             <a:endParaRPr lang="en-US" dirty="0"/>
           </a:p>
@@ -2915,7 +3010,7 @@
           <a:p>
             <a:fld id="{39667345-2558-425A-8533-9BFDBCE15005}" type="datetime1">
               <a:rPr lang="en-US" smtClean="0"/>
-              <a:t>5/5/2020</a:t>
+              <a:t>5/7/2020</a:t>
             </a:fld>
             <a:endParaRPr lang="en-US" dirty="0"/>
           </a:p>
@@ -3244,7 +3339,7 @@
           <a:p>
             <a:fld id="{92BEA474-078D-4E9B-9B14-09A87B19DC46}" type="datetime1">
               <a:rPr lang="en-US" smtClean="0"/>
-              <a:t>5/5/2020</a:t>
+              <a:t>5/7/2020</a:t>
             </a:fld>
             <a:endParaRPr lang="en-US" dirty="0"/>
           </a:p>
@@ -3594,7 +3689,7 @@
           <a:p>
             <a:fld id="{4907D986-8816-4272-A432-0437A28A9828}" type="datetime1">
               <a:rPr lang="en-US" smtClean="0"/>
-              <a:t>5/5/2020</a:t>
+              <a:t>5/7/2020</a:t>
             </a:fld>
             <a:endParaRPr lang="en-US" dirty="0"/>
           </a:p>
@@ -3855,7 +3950,7 @@
           <a:p>
             <a:fld id="{62D6E202-B606-4609-B914-27C9371A1F6D}" type="datetime1">
               <a:rPr lang="en-US" smtClean="0"/>
-              <a:t>5/5/2020</a:t>
+              <a:t>5/7/2020</a:t>
             </a:fld>
             <a:endParaRPr lang="en-US" dirty="0"/>
           </a:p>
@@ -4842,8 +4937,8 @@
           <a:lstStyle/>
           <a:p>
             <a:r>
-              <a:rPr lang="en-GB" dirty="0"/>
-              <a:t>Results</a:t>
+              <a:rPr lang="en-GB" b="1" dirty="0"/>
+              <a:t>Results – Cross Validation and Predictions</a:t>
             </a:r>
           </a:p>
         </p:txBody>
@@ -4866,14 +4961,17 @@
         </p:nvSpPr>
         <p:spPr>
           <a:xfrm>
-            <a:off x="1097279" y="2178539"/>
-            <a:ext cx="10058400" cy="3760891"/>
+            <a:off x="1171851" y="2178539"/>
+            <a:ext cx="9983827" cy="3760891"/>
           </a:xfrm>
         </p:spPr>
         <p:txBody>
           <a:bodyPr/>
           <a:lstStyle/>
           <a:p>
+            <a:pPr marL="0" indent="0">
+              <a:buNone/>
+            </a:pPr>
             <a:r>
               <a:rPr lang="en-GB" b="1" dirty="0"/>
               <a:t>Optimization:</a:t>
@@ -4928,8 +5026,8 @@
         </p:blipFill>
         <p:spPr>
           <a:xfrm>
-            <a:off x="1097279" y="2619227"/>
-            <a:ext cx="6527409" cy="1066507"/>
+            <a:off x="1171851" y="2619349"/>
+            <a:ext cx="5784100" cy="1162660"/>
           </a:xfrm>
           <a:prstGeom prst="rect">
             <a:avLst/>
@@ -4956,8 +5054,8 @@
         </p:blipFill>
         <p:spPr>
           <a:xfrm>
-            <a:off x="1097278" y="4677009"/>
-            <a:ext cx="6527409" cy="528037"/>
+            <a:off x="1171851" y="4583989"/>
+            <a:ext cx="5784101" cy="276730"/>
           </a:xfrm>
           <a:prstGeom prst="rect">
             <a:avLst/>
@@ -5066,84 +5164,12 @@
             <a:endParaRPr lang="en-GB" b="1" u="sng" dirty="0"/>
           </a:p>
           <a:p>
-            <a:pPr marL="0" indent="0">
+            <a:pPr marL="292608" lvl="1" indent="0">
               <a:buNone/>
             </a:pPr>
             <a:r>
               <a:rPr lang="en-GB" b="1" dirty="0"/>
-              <a:t>Each row represents a </a:t>
-            </a:r>
-            <a:r>
-              <a:rPr lang="en-GB" b="1" i="1" u="sng" dirty="0"/>
-              <a:t>whole sale purchase</a:t>
-            </a:r>
-            <a:r>
-              <a:rPr lang="en-GB" b="1" dirty="0"/>
-              <a:t> of an item along with details about the purchase such as: the </a:t>
-            </a:r>
-            <a:r>
-              <a:rPr lang="en-GB" b="1" i="1" u="sng" dirty="0"/>
-              <a:t>invoice ID</a:t>
-            </a:r>
-            <a:r>
-              <a:rPr lang="en-GB" b="1" dirty="0"/>
-              <a:t>, </a:t>
-            </a:r>
-            <a:r>
-              <a:rPr lang="en-GB" b="1" i="1" u="sng" dirty="0"/>
-              <a:t>stock code</a:t>
-            </a:r>
-            <a:r>
-              <a:rPr lang="en-GB" b="1" dirty="0"/>
-              <a:t>, item </a:t>
-            </a:r>
-            <a:r>
-              <a:rPr lang="en-GB" b="1" i="1" u="sng" dirty="0"/>
-              <a:t>description</a:t>
-            </a:r>
-            <a:r>
-              <a:rPr lang="en-GB" b="1" dirty="0"/>
-              <a:t>, </a:t>
-            </a:r>
-            <a:r>
-              <a:rPr lang="en-GB" b="1" i="1" u="sng" dirty="0"/>
-              <a:t>quantity</a:t>
-            </a:r>
-            <a:r>
-              <a:rPr lang="en-GB" b="1" dirty="0"/>
-              <a:t> purchased, </a:t>
-            </a:r>
-            <a:r>
-              <a:rPr lang="en-GB" b="1" i="1" u="sng" dirty="0"/>
-              <a:t>price per unit</a:t>
-            </a:r>
-            <a:r>
-              <a:rPr lang="en-GB" b="1" dirty="0"/>
-              <a:t>, the </a:t>
-            </a:r>
-            <a:r>
-              <a:rPr lang="en-GB" b="1" i="1" u="sng" dirty="0"/>
-              <a:t>ID</a:t>
-            </a:r>
-            <a:r>
-              <a:rPr lang="en-GB" b="1" dirty="0"/>
-              <a:t> and </a:t>
-            </a:r>
-            <a:r>
-              <a:rPr lang="en-GB" b="1" i="1" u="sng" dirty="0"/>
-              <a:t>country</a:t>
-            </a:r>
-            <a:r>
-              <a:rPr lang="en-GB" b="1" dirty="0"/>
-              <a:t> of the </a:t>
-            </a:r>
-            <a:r>
-              <a:rPr lang="en-GB" b="1" i="1" u="sng" dirty="0"/>
-              <a:t>customer</a:t>
-            </a:r>
-            <a:r>
-              <a:rPr lang="en-GB" b="1" dirty="0"/>
-              <a:t> who made the purchase.</a:t>
+              <a:t>Each row represents a whole sale purchase of an item along with details about the purchase such as: the invoice ID, stock code, item description, quantity purchased, price per unit, the ID and country of the customer who made the purchase.</a:t>
             </a:r>
             <a:endParaRPr lang="en-GB" dirty="0"/>
           </a:p>
@@ -5165,12 +5191,12 @@
             <a:endParaRPr lang="en-GB" b="1" u="sng" dirty="0"/>
           </a:p>
           <a:p>
-            <a:pPr marL="0" indent="0">
+            <a:pPr marL="292608" lvl="1" indent="0">
               <a:buNone/>
             </a:pPr>
             <a:r>
-              <a:rPr lang="en-GB" dirty="0"/>
-              <a:t># More details here</a:t>
+              <a:rPr lang="en-GB" b="1" dirty="0"/>
+              <a:t>Each row represents a customer recite (list of the items bought) with no details about the purchase but the names of the items.</a:t>
             </a:r>
           </a:p>
           <a:p>
@@ -5179,7 +5205,7 @@
               <a:buChar char="v"/>
             </a:pPr>
             <a:r>
-              <a:rPr lang="en-GB" b="1" u="sng" dirty="0">
+              <a:rPr lang="en-GB" b="1" u="sng" dirty="0" err="1">
                 <a:hlinkClick r:id="rId5"/>
               </a:rPr>
               <a:t>MovieLens</a:t>
@@ -5188,15 +5214,16 @@
               <a:rPr lang="en-GB" b="1" dirty="0"/>
               <a:t>: movie rating data – 100K records</a:t>
             </a:r>
-            <a:endParaRPr lang="en-GB" b="1" u="sng" dirty="0"/>
-          </a:p>
-          <a:p>
-            <a:pPr marL="0" indent="0">
-              <a:buNone/>
-            </a:pPr>
+            <a:br>
+              <a:rPr lang="en-GB" b="1" u="sng" dirty="0"/>
+            </a:br>
             <a:r>
               <a:rPr lang="en-GB" dirty="0"/>
-              <a:t># More details here</a:t>
+              <a:t>    </a:t>
+            </a:r>
+            <a:r>
+              <a:rPr lang="en-GB" sz="1800" b="1" dirty="0"/>
+              <a:t>Each row represents one review by one customer.</a:t>
             </a:r>
           </a:p>
         </p:txBody>
@@ -5279,10 +5306,15 @@
             <p:ph idx="1"/>
           </p:nvPr>
         </p:nvSpPr>
-        <p:spPr/>
+        <p:spPr>
+          <a:xfrm>
+            <a:off x="1097280" y="2108201"/>
+            <a:ext cx="4708716" cy="3760891"/>
+          </a:xfrm>
+        </p:spPr>
         <p:txBody>
           <a:bodyPr>
-            <a:normAutofit lnSpcReduction="10000"/>
+            <a:normAutofit/>
           </a:bodyPr>
           <a:lstStyle/>
           <a:p>
@@ -5295,11 +5327,22 @@
                 <a:latin typeface="Arial" panose="020B0604020202020204" pitchFamily="34" charset="0"/>
                 <a:cs typeface="Arial" panose="020B0604020202020204" pitchFamily="34" charset="0"/>
               </a:rPr>
-              <a:t>Association Rules Mining, Apriori – Aleksandra Petkova, Nour Aldin Almubarak</a:t>
-            </a:r>
-          </a:p>
-          <a:p>
-            <a:pPr>
+              <a:t> Association Rules Mining, </a:t>
+            </a:r>
+            <a:r>
+              <a:rPr lang="en-GB" b="1" i="1" dirty="0" err="1">
+                <a:latin typeface="Arial" panose="020B0604020202020204" pitchFamily="34" charset="0"/>
+                <a:cs typeface="Arial" panose="020B0604020202020204" pitchFamily="34" charset="0"/>
+              </a:rPr>
+              <a:t>Apriori</a:t>
+            </a:r>
+            <a:endParaRPr lang="en-GB" b="1" i="1" dirty="0">
+              <a:latin typeface="Arial" panose="020B0604020202020204" pitchFamily="34" charset="0"/>
+              <a:cs typeface="Arial" panose="020B0604020202020204" pitchFamily="34" charset="0"/>
+            </a:endParaRPr>
+          </a:p>
+          <a:p>
+            <a:pPr lvl="1">
               <a:buFont typeface="Arial" panose="020B0604020202020204" pitchFamily="34" charset="0"/>
               <a:buChar char="•"/>
             </a:pPr>
@@ -5309,23 +5352,23 @@
             </a:r>
           </a:p>
           <a:p>
-            <a:pPr>
+            <a:pPr lvl="1">
               <a:buFont typeface="Arial" panose="020B0604020202020204" pitchFamily="34" charset="0"/>
               <a:buChar char="•"/>
             </a:pPr>
             <a:r>
               <a:rPr lang="en-GB" dirty="0"/>
-              <a:t>Questions </a:t>
-            </a:r>
-          </a:p>
-          <a:p>
-            <a:pPr>
+              <a:t> Questions </a:t>
+            </a:r>
+          </a:p>
+          <a:p>
+            <a:pPr lvl="1">
               <a:buFont typeface="Arial" panose="020B0604020202020204" pitchFamily="34" charset="0"/>
               <a:buChar char="•"/>
             </a:pPr>
             <a:r>
               <a:rPr lang="en-GB" dirty="0"/>
-              <a:t>Results</a:t>
+              <a:t> Results</a:t>
             </a:r>
             <a:endParaRPr lang="en-GB" i="1" dirty="0"/>
           </a:p>
@@ -5339,42 +5382,7 @@
                 <a:latin typeface="Arial" panose="020B0604020202020204" pitchFamily="34" charset="0"/>
                 <a:cs typeface="Arial" panose="020B0604020202020204" pitchFamily="34" charset="0"/>
               </a:rPr>
-              <a:t>Collaborative Filtering</a:t>
-            </a:r>
-            <a:r>
-              <a:rPr lang="en-GB" i="1" dirty="0">
-                <a:latin typeface="Arial" panose="020B0604020202020204" pitchFamily="34" charset="0"/>
-                <a:cs typeface="Arial" panose="020B0604020202020204" pitchFamily="34" charset="0"/>
-              </a:rPr>
-              <a:t> </a:t>
-            </a:r>
-            <a:r>
-              <a:rPr lang="en-GB" b="1" i="1" dirty="0">
-                <a:latin typeface="Arial" panose="020B0604020202020204" pitchFamily="34" charset="0"/>
-                <a:cs typeface="Arial" panose="020B0604020202020204" pitchFamily="34" charset="0"/>
-              </a:rPr>
-              <a:t>– Victor Essien, Nour </a:t>
-            </a:r>
-            <a:r>
-              <a:rPr lang="en-GB" b="1" i="1" dirty="0" err="1">
-                <a:latin typeface="Arial" panose="020B0604020202020204" pitchFamily="34" charset="0"/>
-                <a:cs typeface="Arial" panose="020B0604020202020204" pitchFamily="34" charset="0"/>
-              </a:rPr>
-              <a:t>Aldin</a:t>
-            </a:r>
-            <a:r>
-              <a:rPr lang="en-GB" b="1" i="1" dirty="0">
-                <a:latin typeface="Arial" panose="020B0604020202020204" pitchFamily="34" charset="0"/>
-                <a:cs typeface="Arial" panose="020B0604020202020204" pitchFamily="34" charset="0"/>
-              </a:rPr>
-              <a:t> </a:t>
-            </a:r>
-            <a:r>
-              <a:rPr lang="en-GB" b="1" i="1" dirty="0" err="1">
-                <a:latin typeface="Arial" panose="020B0604020202020204" pitchFamily="34" charset="0"/>
-                <a:cs typeface="Arial" panose="020B0604020202020204" pitchFamily="34" charset="0"/>
-              </a:rPr>
-              <a:t>Almubarak</a:t>
+              <a:t> Collaborative Filtering</a:t>
             </a:r>
             <a:endParaRPr lang="en-GB" b="1" dirty="0">
               <a:latin typeface="Arial" panose="020B0604020202020204" pitchFamily="34" charset="0"/>
@@ -5382,38 +5390,332 @@
             </a:endParaRPr>
           </a:p>
           <a:p>
-            <a:pPr>
+            <a:pPr lvl="1">
               <a:buFont typeface="Arial" panose="020B0604020202020204" pitchFamily="34" charset="0"/>
               <a:buChar char="•"/>
             </a:pPr>
             <a:r>
               <a:rPr lang="en-GB" dirty="0"/>
-              <a:t>Algorithm</a:t>
-            </a:r>
-          </a:p>
-          <a:p>
-            <a:pPr>
+              <a:t> Algorithm</a:t>
+            </a:r>
+          </a:p>
+          <a:p>
+            <a:pPr lvl="1">
               <a:buFont typeface="Arial" panose="020B0604020202020204" pitchFamily="34" charset="0"/>
               <a:buChar char="•"/>
             </a:pPr>
             <a:r>
               <a:rPr lang="en-GB" dirty="0"/>
-              <a:t>Questions </a:t>
-            </a:r>
-          </a:p>
-          <a:p>
-            <a:pPr>
+              <a:t> Questions </a:t>
+            </a:r>
+          </a:p>
+          <a:p>
+            <a:pPr lvl="1">
               <a:buFont typeface="Arial" panose="020B0604020202020204" pitchFamily="34" charset="0"/>
               <a:buChar char="•"/>
             </a:pPr>
             <a:r>
               <a:rPr lang="en-GB" dirty="0"/>
-              <a:t>Results</a:t>
+              <a:t> Results</a:t>
             </a:r>
             <a:endParaRPr lang="en-GB" i="1" dirty="0"/>
           </a:p>
           <a:p>
             <a:pPr marL="0" indent="0">
+              <a:buNone/>
+            </a:pPr>
+            <a:endParaRPr lang="en-GB" dirty="0"/>
+          </a:p>
+        </p:txBody>
+      </p:sp>
+      <p:sp>
+        <p:nvSpPr>
+          <p:cNvPr id="4" name="Content Placeholder 2">
+            <a:extLst>
+              <a:ext uri="{FF2B5EF4-FFF2-40B4-BE49-F238E27FC236}">
+                <a16:creationId xmlns:a16="http://schemas.microsoft.com/office/drawing/2014/main" id="{EDF014A7-1C6B-46E1-8BD9-F35064996309}"/>
+              </a:ext>
+            </a:extLst>
+          </p:cNvPr>
+          <p:cNvSpPr txBox="1">
+            <a:spLocks/>
+          </p:cNvSpPr>
+          <p:nvPr/>
+        </p:nvSpPr>
+        <p:spPr>
+          <a:xfrm>
+            <a:off x="6729274" y="2108201"/>
+            <a:ext cx="4160075" cy="3760891"/>
+          </a:xfrm>
+          <a:prstGeom prst="rect">
+            <a:avLst/>
+          </a:prstGeom>
+        </p:spPr>
+        <p:txBody>
+          <a:bodyPr vert="horz" lIns="0" tIns="45720" rIns="0" bIns="45720" rtlCol="0">
+            <a:normAutofit/>
+          </a:bodyPr>
+          <a:lstStyle>
+            <a:lvl1pPr marL="91440" indent="-91440" algn="l" defTabSz="914400" rtl="0" eaLnBrk="1" latinLnBrk="0" hangingPunct="1">
+              <a:lnSpc>
+                <a:spcPct val="100000"/>
+              </a:lnSpc>
+              <a:spcBef>
+                <a:spcPts val="1200"/>
+              </a:spcBef>
+              <a:spcAft>
+                <a:spcPts val="200"/>
+              </a:spcAft>
+              <a:buClr>
+                <a:schemeClr val="accent1"/>
+              </a:buClr>
+              <a:buSzPct val="100000"/>
+              <a:buFont typeface="Calibri" panose="020F0502020204030204" pitchFamily="34" charset="0"/>
+              <a:buChar char=" "/>
+              <a:defRPr sz="2000" kern="1200">
+                <a:solidFill>
+                  <a:schemeClr val="tx1">
+                    <a:lumMod val="75000"/>
+                    <a:lumOff val="25000"/>
+                  </a:schemeClr>
+                </a:solidFill>
+                <a:latin typeface="+mn-lt"/>
+                <a:ea typeface="+mn-ea"/>
+                <a:cs typeface="+mn-cs"/>
+              </a:defRPr>
+            </a:lvl1pPr>
+            <a:lvl2pPr marL="384048" indent="-182880" algn="l" defTabSz="914400" rtl="0" eaLnBrk="1" latinLnBrk="0" hangingPunct="1">
+              <a:lnSpc>
+                <a:spcPct val="100000"/>
+              </a:lnSpc>
+              <a:spcBef>
+                <a:spcPts val="200"/>
+              </a:spcBef>
+              <a:spcAft>
+                <a:spcPts val="400"/>
+              </a:spcAft>
+              <a:buClrTx/>
+              <a:buFont typeface="Calibri" pitchFamily="34" charset="0"/>
+              <a:buChar char="◦"/>
+              <a:defRPr sz="1800" kern="1200">
+                <a:solidFill>
+                  <a:schemeClr val="tx1">
+                    <a:lumMod val="75000"/>
+                    <a:lumOff val="25000"/>
+                  </a:schemeClr>
+                </a:solidFill>
+                <a:latin typeface="+mn-lt"/>
+                <a:ea typeface="+mn-ea"/>
+                <a:cs typeface="+mn-cs"/>
+              </a:defRPr>
+            </a:lvl2pPr>
+            <a:lvl3pPr marL="566928" indent="-182880" algn="l" defTabSz="914400" rtl="0" eaLnBrk="1" latinLnBrk="0" hangingPunct="1">
+              <a:lnSpc>
+                <a:spcPct val="100000"/>
+              </a:lnSpc>
+              <a:spcBef>
+                <a:spcPts val="200"/>
+              </a:spcBef>
+              <a:spcAft>
+                <a:spcPts val="400"/>
+              </a:spcAft>
+              <a:buClrTx/>
+              <a:buFont typeface="Calibri" pitchFamily="34" charset="0"/>
+              <a:buChar char="◦"/>
+              <a:defRPr sz="1400" kern="1200">
+                <a:solidFill>
+                  <a:schemeClr val="tx1">
+                    <a:lumMod val="75000"/>
+                    <a:lumOff val="25000"/>
+                  </a:schemeClr>
+                </a:solidFill>
+                <a:latin typeface="+mn-lt"/>
+                <a:ea typeface="+mn-ea"/>
+                <a:cs typeface="+mn-cs"/>
+              </a:defRPr>
+            </a:lvl3pPr>
+            <a:lvl4pPr marL="749808" indent="-182880" algn="l" defTabSz="914400" rtl="0" eaLnBrk="1" latinLnBrk="0" hangingPunct="1">
+              <a:lnSpc>
+                <a:spcPct val="100000"/>
+              </a:lnSpc>
+              <a:spcBef>
+                <a:spcPts val="200"/>
+              </a:spcBef>
+              <a:spcAft>
+                <a:spcPts val="400"/>
+              </a:spcAft>
+              <a:buClrTx/>
+              <a:buFont typeface="Calibri" pitchFamily="34" charset="0"/>
+              <a:buChar char="◦"/>
+              <a:defRPr sz="1400" kern="1200">
+                <a:solidFill>
+                  <a:schemeClr val="tx1">
+                    <a:lumMod val="75000"/>
+                    <a:lumOff val="25000"/>
+                  </a:schemeClr>
+                </a:solidFill>
+                <a:latin typeface="+mn-lt"/>
+                <a:ea typeface="+mn-ea"/>
+                <a:cs typeface="+mn-cs"/>
+              </a:defRPr>
+            </a:lvl4pPr>
+            <a:lvl5pPr marL="932688" indent="-182880" algn="l" defTabSz="914400" rtl="0" eaLnBrk="1" latinLnBrk="0" hangingPunct="1">
+              <a:lnSpc>
+                <a:spcPct val="100000"/>
+              </a:lnSpc>
+              <a:spcBef>
+                <a:spcPts val="200"/>
+              </a:spcBef>
+              <a:spcAft>
+                <a:spcPts val="400"/>
+              </a:spcAft>
+              <a:buClrTx/>
+              <a:buFont typeface="Calibri" pitchFamily="34" charset="0"/>
+              <a:buChar char="◦"/>
+              <a:defRPr sz="1400" kern="1200">
+                <a:solidFill>
+                  <a:schemeClr val="tx1">
+                    <a:lumMod val="75000"/>
+                    <a:lumOff val="25000"/>
+                  </a:schemeClr>
+                </a:solidFill>
+                <a:latin typeface="+mn-lt"/>
+                <a:ea typeface="+mn-ea"/>
+                <a:cs typeface="+mn-cs"/>
+              </a:defRPr>
+            </a:lvl5pPr>
+            <a:lvl6pPr marL="1100000" indent="-228600" algn="l" defTabSz="914400" rtl="0" eaLnBrk="1" latinLnBrk="0" hangingPunct="1">
+              <a:lnSpc>
+                <a:spcPct val="90000"/>
+              </a:lnSpc>
+              <a:spcBef>
+                <a:spcPts val="200"/>
+              </a:spcBef>
+              <a:spcAft>
+                <a:spcPts val="400"/>
+              </a:spcAft>
+              <a:buClr>
+                <a:schemeClr val="accent1"/>
+              </a:buClr>
+              <a:buFont typeface="Calibri" pitchFamily="34" charset="0"/>
+              <a:buChar char="◦"/>
+              <a:defRPr sz="1400" kern="1200">
+                <a:solidFill>
+                  <a:schemeClr val="tx1">
+                    <a:lumMod val="75000"/>
+                    <a:lumOff val="25000"/>
+                  </a:schemeClr>
+                </a:solidFill>
+                <a:latin typeface="+mn-lt"/>
+                <a:ea typeface="+mn-ea"/>
+                <a:cs typeface="+mn-cs"/>
+              </a:defRPr>
+            </a:lvl6pPr>
+            <a:lvl7pPr marL="1300000" indent="-228600" algn="l" defTabSz="914400" rtl="0" eaLnBrk="1" latinLnBrk="0" hangingPunct="1">
+              <a:lnSpc>
+                <a:spcPct val="90000"/>
+              </a:lnSpc>
+              <a:spcBef>
+                <a:spcPts val="200"/>
+              </a:spcBef>
+              <a:spcAft>
+                <a:spcPts val="400"/>
+              </a:spcAft>
+              <a:buClr>
+                <a:schemeClr val="accent1"/>
+              </a:buClr>
+              <a:buFont typeface="Calibri" pitchFamily="34" charset="0"/>
+              <a:buChar char="◦"/>
+              <a:defRPr sz="1400" kern="1200">
+                <a:solidFill>
+                  <a:schemeClr val="tx1">
+                    <a:lumMod val="75000"/>
+                    <a:lumOff val="25000"/>
+                  </a:schemeClr>
+                </a:solidFill>
+                <a:latin typeface="+mn-lt"/>
+                <a:ea typeface="+mn-ea"/>
+                <a:cs typeface="+mn-cs"/>
+              </a:defRPr>
+            </a:lvl7pPr>
+            <a:lvl8pPr marL="1500000" indent="-228600" algn="l" defTabSz="914400" rtl="0" eaLnBrk="1" latinLnBrk="0" hangingPunct="1">
+              <a:lnSpc>
+                <a:spcPct val="90000"/>
+              </a:lnSpc>
+              <a:spcBef>
+                <a:spcPts val="200"/>
+              </a:spcBef>
+              <a:spcAft>
+                <a:spcPts val="400"/>
+              </a:spcAft>
+              <a:buClr>
+                <a:schemeClr val="accent1"/>
+              </a:buClr>
+              <a:buFont typeface="Calibri" pitchFamily="34" charset="0"/>
+              <a:buChar char="◦"/>
+              <a:defRPr sz="1400" kern="1200">
+                <a:solidFill>
+                  <a:schemeClr val="tx1">
+                    <a:lumMod val="75000"/>
+                    <a:lumOff val="25000"/>
+                  </a:schemeClr>
+                </a:solidFill>
+                <a:latin typeface="+mn-lt"/>
+                <a:ea typeface="+mn-ea"/>
+                <a:cs typeface="+mn-cs"/>
+              </a:defRPr>
+            </a:lvl8pPr>
+            <a:lvl9pPr marL="1700000" indent="-228600" algn="l" defTabSz="914400" rtl="0" eaLnBrk="1" latinLnBrk="0" hangingPunct="1">
+              <a:lnSpc>
+                <a:spcPct val="90000"/>
+              </a:lnSpc>
+              <a:spcBef>
+                <a:spcPts val="200"/>
+              </a:spcBef>
+              <a:spcAft>
+                <a:spcPts val="400"/>
+              </a:spcAft>
+              <a:buClr>
+                <a:schemeClr val="accent1"/>
+              </a:buClr>
+              <a:buFont typeface="Calibri" pitchFamily="34" charset="0"/>
+              <a:buChar char="◦"/>
+              <a:defRPr sz="1400" kern="1200">
+                <a:solidFill>
+                  <a:schemeClr val="tx1">
+                    <a:lumMod val="75000"/>
+                    <a:lumOff val="25000"/>
+                  </a:schemeClr>
+                </a:solidFill>
+                <a:latin typeface="+mn-lt"/>
+                <a:ea typeface="+mn-ea"/>
+                <a:cs typeface="+mn-cs"/>
+              </a:defRPr>
+            </a:lvl9pPr>
+          </a:lstStyle>
+          <a:p>
+            <a:pPr marL="0" indent="0">
+              <a:buNone/>
+            </a:pPr>
+            <a:r>
+              <a:rPr lang="en-GB" b="1" i="1" dirty="0">
+                <a:solidFill>
+                  <a:srgbClr val="FF0000"/>
+                </a:solidFill>
+                <a:latin typeface="Arial" panose="020B0604020202020204" pitchFamily="34" charset="0"/>
+                <a:cs typeface="Arial" panose="020B0604020202020204" pitchFamily="34" charset="0"/>
+              </a:rPr>
+              <a:t>SOME RELATED IMAGES HERE</a:t>
+            </a:r>
+            <a:endParaRPr lang="en-GB" i="1" dirty="0">
+              <a:solidFill>
+                <a:srgbClr val="FF0000"/>
+              </a:solidFill>
+            </a:endParaRPr>
+          </a:p>
+          <a:p>
+            <a:pPr marL="0" indent="0">
+              <a:buFont typeface="Calibri" panose="020F0502020204030204" pitchFamily="34" charset="0"/>
               <a:buNone/>
             </a:pPr>
             <a:endParaRPr lang="en-GB" dirty="0"/>
@@ -5468,15 +5770,20 @@
         </p:nvSpPr>
         <p:spPr/>
         <p:txBody>
-          <a:bodyPr/>
+          <a:bodyPr>
+            <a:normAutofit fontScale="90000"/>
+          </a:bodyPr>
           <a:lstStyle/>
           <a:p>
             <a:br>
               <a:rPr lang="en-GB" dirty="0"/>
             </a:br>
-            <a:r>
+            <a:br>
               <a:rPr lang="en-GB" dirty="0"/>
-              <a:t>Algorithm</a:t>
+            </a:br>
+            <a:r>
+              <a:rPr lang="en-GB" b="1" dirty="0"/>
+              <a:t>Association Rules Mining</a:t>
             </a:r>
           </a:p>
         </p:txBody>
@@ -5605,7 +5912,7 @@
           <a:lstStyle/>
           <a:p>
             <a:r>
-              <a:rPr lang="en-GB" dirty="0"/>
+              <a:rPr lang="en-GB" b="1" dirty="0"/>
               <a:t>Questions</a:t>
             </a:r>
           </a:p>
@@ -5627,7 +5934,12 @@
             <p:ph idx="1"/>
           </p:nvPr>
         </p:nvSpPr>
-        <p:spPr/>
+        <p:spPr>
+          <a:xfrm>
+            <a:off x="1097280" y="2108202"/>
+            <a:ext cx="10058400" cy="2179714"/>
+          </a:xfrm>
+        </p:spPr>
         <p:txBody>
           <a:bodyPr/>
           <a:lstStyle/>
@@ -5712,6 +6024,339 @@
           </a:p>
         </p:txBody>
       </p:sp>
+      <p:sp>
+        <p:nvSpPr>
+          <p:cNvPr id="5" name="Content Placeholder 2">
+            <a:extLst>
+              <a:ext uri="{FF2B5EF4-FFF2-40B4-BE49-F238E27FC236}">
+                <a16:creationId xmlns:a16="http://schemas.microsoft.com/office/drawing/2014/main" id="{A4C7655E-2EB6-4C36-BFBC-1445EBB84DC2}"/>
+              </a:ext>
+            </a:extLst>
+          </p:cNvPr>
+          <p:cNvSpPr txBox="1">
+            <a:spLocks/>
+          </p:cNvSpPr>
+          <p:nvPr/>
+        </p:nvSpPr>
+        <p:spPr>
+          <a:xfrm>
+            <a:off x="1017381" y="4417762"/>
+            <a:ext cx="2942060" cy="377547"/>
+          </a:xfrm>
+          <a:prstGeom prst="rect">
+            <a:avLst/>
+          </a:prstGeom>
+        </p:spPr>
+        <p:txBody>
+          <a:bodyPr vert="horz" lIns="0" tIns="45720" rIns="0" bIns="45720" rtlCol="0">
+            <a:normAutofit fontScale="92500" lnSpcReduction="10000"/>
+          </a:bodyPr>
+          <a:lstStyle>
+            <a:lvl1pPr marL="91440" indent="-91440" algn="l" defTabSz="914400" rtl="0" eaLnBrk="1" latinLnBrk="0" hangingPunct="1">
+              <a:lnSpc>
+                <a:spcPct val="100000"/>
+              </a:lnSpc>
+              <a:spcBef>
+                <a:spcPts val="1200"/>
+              </a:spcBef>
+              <a:spcAft>
+                <a:spcPts val="200"/>
+              </a:spcAft>
+              <a:buClr>
+                <a:schemeClr val="accent1"/>
+              </a:buClr>
+              <a:buSzPct val="100000"/>
+              <a:buFont typeface="Calibri" panose="020F0502020204030204" pitchFamily="34" charset="0"/>
+              <a:buChar char=" "/>
+              <a:defRPr sz="2000" kern="1200">
+                <a:solidFill>
+                  <a:schemeClr val="tx1">
+                    <a:lumMod val="75000"/>
+                    <a:lumOff val="25000"/>
+                  </a:schemeClr>
+                </a:solidFill>
+                <a:latin typeface="+mn-lt"/>
+                <a:ea typeface="+mn-ea"/>
+                <a:cs typeface="+mn-cs"/>
+              </a:defRPr>
+            </a:lvl1pPr>
+            <a:lvl2pPr marL="384048" indent="-182880" algn="l" defTabSz="914400" rtl="0" eaLnBrk="1" latinLnBrk="0" hangingPunct="1">
+              <a:lnSpc>
+                <a:spcPct val="100000"/>
+              </a:lnSpc>
+              <a:spcBef>
+                <a:spcPts val="200"/>
+              </a:spcBef>
+              <a:spcAft>
+                <a:spcPts val="400"/>
+              </a:spcAft>
+              <a:buClrTx/>
+              <a:buFont typeface="Calibri" pitchFamily="34" charset="0"/>
+              <a:buChar char="◦"/>
+              <a:defRPr sz="1800" kern="1200">
+                <a:solidFill>
+                  <a:schemeClr val="tx1">
+                    <a:lumMod val="75000"/>
+                    <a:lumOff val="25000"/>
+                  </a:schemeClr>
+                </a:solidFill>
+                <a:latin typeface="+mn-lt"/>
+                <a:ea typeface="+mn-ea"/>
+                <a:cs typeface="+mn-cs"/>
+              </a:defRPr>
+            </a:lvl2pPr>
+            <a:lvl3pPr marL="566928" indent="-182880" algn="l" defTabSz="914400" rtl="0" eaLnBrk="1" latinLnBrk="0" hangingPunct="1">
+              <a:lnSpc>
+                <a:spcPct val="100000"/>
+              </a:lnSpc>
+              <a:spcBef>
+                <a:spcPts val="200"/>
+              </a:spcBef>
+              <a:spcAft>
+                <a:spcPts val="400"/>
+              </a:spcAft>
+              <a:buClrTx/>
+              <a:buFont typeface="Calibri" pitchFamily="34" charset="0"/>
+              <a:buChar char="◦"/>
+              <a:defRPr sz="1400" kern="1200">
+                <a:solidFill>
+                  <a:schemeClr val="tx1">
+                    <a:lumMod val="75000"/>
+                    <a:lumOff val="25000"/>
+                  </a:schemeClr>
+                </a:solidFill>
+                <a:latin typeface="+mn-lt"/>
+                <a:ea typeface="+mn-ea"/>
+                <a:cs typeface="+mn-cs"/>
+              </a:defRPr>
+            </a:lvl3pPr>
+            <a:lvl4pPr marL="749808" indent="-182880" algn="l" defTabSz="914400" rtl="0" eaLnBrk="1" latinLnBrk="0" hangingPunct="1">
+              <a:lnSpc>
+                <a:spcPct val="100000"/>
+              </a:lnSpc>
+              <a:spcBef>
+                <a:spcPts val="200"/>
+              </a:spcBef>
+              <a:spcAft>
+                <a:spcPts val="400"/>
+              </a:spcAft>
+              <a:buClrTx/>
+              <a:buFont typeface="Calibri" pitchFamily="34" charset="0"/>
+              <a:buChar char="◦"/>
+              <a:defRPr sz="1400" kern="1200">
+                <a:solidFill>
+                  <a:schemeClr val="tx1">
+                    <a:lumMod val="75000"/>
+                    <a:lumOff val="25000"/>
+                  </a:schemeClr>
+                </a:solidFill>
+                <a:latin typeface="+mn-lt"/>
+                <a:ea typeface="+mn-ea"/>
+                <a:cs typeface="+mn-cs"/>
+              </a:defRPr>
+            </a:lvl4pPr>
+            <a:lvl5pPr marL="932688" indent="-182880" algn="l" defTabSz="914400" rtl="0" eaLnBrk="1" latinLnBrk="0" hangingPunct="1">
+              <a:lnSpc>
+                <a:spcPct val="100000"/>
+              </a:lnSpc>
+              <a:spcBef>
+                <a:spcPts val="200"/>
+              </a:spcBef>
+              <a:spcAft>
+                <a:spcPts val="400"/>
+              </a:spcAft>
+              <a:buClrTx/>
+              <a:buFont typeface="Calibri" pitchFamily="34" charset="0"/>
+              <a:buChar char="◦"/>
+              <a:defRPr sz="1400" kern="1200">
+                <a:solidFill>
+                  <a:schemeClr val="tx1">
+                    <a:lumMod val="75000"/>
+                    <a:lumOff val="25000"/>
+                  </a:schemeClr>
+                </a:solidFill>
+                <a:latin typeface="+mn-lt"/>
+                <a:ea typeface="+mn-ea"/>
+                <a:cs typeface="+mn-cs"/>
+              </a:defRPr>
+            </a:lvl5pPr>
+            <a:lvl6pPr marL="1100000" indent="-228600" algn="l" defTabSz="914400" rtl="0" eaLnBrk="1" latinLnBrk="0" hangingPunct="1">
+              <a:lnSpc>
+                <a:spcPct val="90000"/>
+              </a:lnSpc>
+              <a:spcBef>
+                <a:spcPts val="200"/>
+              </a:spcBef>
+              <a:spcAft>
+                <a:spcPts val="400"/>
+              </a:spcAft>
+              <a:buClr>
+                <a:schemeClr val="accent1"/>
+              </a:buClr>
+              <a:buFont typeface="Calibri" pitchFamily="34" charset="0"/>
+              <a:buChar char="◦"/>
+              <a:defRPr sz="1400" kern="1200">
+                <a:solidFill>
+                  <a:schemeClr val="tx1">
+                    <a:lumMod val="75000"/>
+                    <a:lumOff val="25000"/>
+                  </a:schemeClr>
+                </a:solidFill>
+                <a:latin typeface="+mn-lt"/>
+                <a:ea typeface="+mn-ea"/>
+                <a:cs typeface="+mn-cs"/>
+              </a:defRPr>
+            </a:lvl6pPr>
+            <a:lvl7pPr marL="1300000" indent="-228600" algn="l" defTabSz="914400" rtl="0" eaLnBrk="1" latinLnBrk="0" hangingPunct="1">
+              <a:lnSpc>
+                <a:spcPct val="90000"/>
+              </a:lnSpc>
+              <a:spcBef>
+                <a:spcPts val="200"/>
+              </a:spcBef>
+              <a:spcAft>
+                <a:spcPts val="400"/>
+              </a:spcAft>
+              <a:buClr>
+                <a:schemeClr val="accent1"/>
+              </a:buClr>
+              <a:buFont typeface="Calibri" pitchFamily="34" charset="0"/>
+              <a:buChar char="◦"/>
+              <a:defRPr sz="1400" kern="1200">
+                <a:solidFill>
+                  <a:schemeClr val="tx1">
+                    <a:lumMod val="75000"/>
+                    <a:lumOff val="25000"/>
+                  </a:schemeClr>
+                </a:solidFill>
+                <a:latin typeface="+mn-lt"/>
+                <a:ea typeface="+mn-ea"/>
+                <a:cs typeface="+mn-cs"/>
+              </a:defRPr>
+            </a:lvl7pPr>
+            <a:lvl8pPr marL="1500000" indent="-228600" algn="l" defTabSz="914400" rtl="0" eaLnBrk="1" latinLnBrk="0" hangingPunct="1">
+              <a:lnSpc>
+                <a:spcPct val="90000"/>
+              </a:lnSpc>
+              <a:spcBef>
+                <a:spcPts val="200"/>
+              </a:spcBef>
+              <a:spcAft>
+                <a:spcPts val="400"/>
+              </a:spcAft>
+              <a:buClr>
+                <a:schemeClr val="accent1"/>
+              </a:buClr>
+              <a:buFont typeface="Calibri" pitchFamily="34" charset="0"/>
+              <a:buChar char="◦"/>
+              <a:defRPr sz="1400" kern="1200">
+                <a:solidFill>
+                  <a:schemeClr val="tx1">
+                    <a:lumMod val="75000"/>
+                    <a:lumOff val="25000"/>
+                  </a:schemeClr>
+                </a:solidFill>
+                <a:latin typeface="+mn-lt"/>
+                <a:ea typeface="+mn-ea"/>
+                <a:cs typeface="+mn-cs"/>
+              </a:defRPr>
+            </a:lvl8pPr>
+            <a:lvl9pPr marL="1700000" indent="-228600" algn="l" defTabSz="914400" rtl="0" eaLnBrk="1" latinLnBrk="0" hangingPunct="1">
+              <a:lnSpc>
+                <a:spcPct val="90000"/>
+              </a:lnSpc>
+              <a:spcBef>
+                <a:spcPts val="200"/>
+              </a:spcBef>
+              <a:spcAft>
+                <a:spcPts val="400"/>
+              </a:spcAft>
+              <a:buClr>
+                <a:schemeClr val="accent1"/>
+              </a:buClr>
+              <a:buFont typeface="Calibri" pitchFamily="34" charset="0"/>
+              <a:buChar char="◦"/>
+              <a:defRPr sz="1400" kern="1200">
+                <a:solidFill>
+                  <a:schemeClr val="tx1">
+                    <a:lumMod val="75000"/>
+                    <a:lumOff val="25000"/>
+                  </a:schemeClr>
+                </a:solidFill>
+                <a:latin typeface="+mn-lt"/>
+                <a:ea typeface="+mn-ea"/>
+                <a:cs typeface="+mn-cs"/>
+              </a:defRPr>
+            </a:lvl9pPr>
+          </a:lstStyle>
+          <a:p>
+            <a:r>
+              <a:rPr lang="en-GB" dirty="0"/>
+              <a:t>Rules List</a:t>
+            </a:r>
+          </a:p>
+        </p:txBody>
+      </p:sp>
+      <p:pic>
+        <p:nvPicPr>
+          <p:cNvPr id="6" name="Picture 5">
+            <a:extLst>
+              <a:ext uri="{FF2B5EF4-FFF2-40B4-BE49-F238E27FC236}">
+                <a16:creationId xmlns:a16="http://schemas.microsoft.com/office/drawing/2014/main" id="{E5554052-CDAD-4E96-B3FA-3FA8A9A0FA81}"/>
+              </a:ext>
+            </a:extLst>
+          </p:cNvPr>
+          <p:cNvPicPr>
+            <a:picLocks noChangeAspect="1"/>
+          </p:cNvPicPr>
+          <p:nvPr/>
+        </p:nvPicPr>
+        <p:blipFill>
+          <a:blip r:embed="rId2"/>
+          <a:stretch>
+            <a:fillRect/>
+          </a:stretch>
+        </p:blipFill>
+        <p:spPr>
+          <a:xfrm>
+            <a:off x="1097280" y="4813725"/>
+            <a:ext cx="6794857" cy="570090"/>
+          </a:xfrm>
+          <a:prstGeom prst="rect">
+            <a:avLst/>
+          </a:prstGeom>
+        </p:spPr>
+      </p:pic>
+      <p:pic>
+        <p:nvPicPr>
+          <p:cNvPr id="7" name="Picture 6">
+            <a:extLst>
+              <a:ext uri="{FF2B5EF4-FFF2-40B4-BE49-F238E27FC236}">
+                <a16:creationId xmlns:a16="http://schemas.microsoft.com/office/drawing/2014/main" id="{E9A92E95-2D46-49EF-8897-26D6291BCC67}"/>
+              </a:ext>
+            </a:extLst>
+          </p:cNvPr>
+          <p:cNvPicPr>
+            <a:picLocks noChangeAspect="1"/>
+          </p:cNvPicPr>
+          <p:nvPr/>
+        </p:nvPicPr>
+        <p:blipFill>
+          <a:blip r:embed="rId3"/>
+          <a:stretch>
+            <a:fillRect/>
+          </a:stretch>
+        </p:blipFill>
+        <p:spPr>
+          <a:xfrm>
+            <a:off x="8522300" y="4479906"/>
+            <a:ext cx="2317335" cy="966053"/>
+          </a:xfrm>
+          <a:prstGeom prst="rect">
+            <a:avLst/>
+          </a:prstGeom>
+        </p:spPr>
+      </p:pic>
     </p:spTree>
     <p:extLst>
       <p:ext uri="{BB962C8B-B14F-4D97-AF65-F5344CB8AC3E}">
@@ -5758,410 +6403,25 @@
             <p:ph type="title"/>
           </p:nvPr>
         </p:nvSpPr>
-        <p:spPr/>
-        <p:txBody>
-          <a:bodyPr/>
-          <a:lstStyle/>
-          <a:p>
-            <a:r>
-              <a:rPr lang="en-GB" dirty="0"/>
-              <a:t>Results</a:t>
-            </a:r>
-            <a:br>
-              <a:rPr lang="en-GB" i="1" dirty="0"/>
-            </a:br>
-            <a:endParaRPr lang="en-GB" dirty="0"/>
-          </a:p>
-        </p:txBody>
-      </p:sp>
-      <p:sp>
-        <p:nvSpPr>
-          <p:cNvPr id="3" name="Content Placeholder 2">
-            <a:extLst>
-              <a:ext uri="{FF2B5EF4-FFF2-40B4-BE49-F238E27FC236}">
-                <a16:creationId xmlns:a16="http://schemas.microsoft.com/office/drawing/2014/main" id="{4CF84F54-A90A-4235-AF9B-18DC5CFC3F1E}"/>
-              </a:ext>
-            </a:extLst>
-          </p:cNvPr>
-          <p:cNvSpPr>
-            <a:spLocks noGrp="1"/>
-          </p:cNvSpPr>
-          <p:nvPr>
-            <p:ph idx="1"/>
-          </p:nvPr>
-        </p:nvSpPr>
         <p:spPr>
           <a:xfrm>
-            <a:off x="1097280" y="2108201"/>
-            <a:ext cx="1175403" cy="377547"/>
+            <a:off x="1106158" y="1066259"/>
+            <a:ext cx="10150728" cy="709492"/>
           </a:xfrm>
         </p:spPr>
         <p:txBody>
           <a:bodyPr>
-            <a:normAutofit fontScale="92500" lnSpcReduction="10000"/>
+            <a:noAutofit/>
           </a:bodyPr>
           <a:lstStyle/>
           <a:p>
             <a:r>
-              <a:rPr lang="en-GB" dirty="0"/>
-              <a:t>Rules List</a:t>
-            </a:r>
-          </a:p>
-        </p:txBody>
-      </p:sp>
-      <p:pic>
-        <p:nvPicPr>
-          <p:cNvPr id="4" name="Picture 3">
-            <a:extLst>
-              <a:ext uri="{FF2B5EF4-FFF2-40B4-BE49-F238E27FC236}">
-                <a16:creationId xmlns:a16="http://schemas.microsoft.com/office/drawing/2014/main" id="{8C8164D3-FFA6-4BF4-AEC0-852691780794}"/>
-              </a:ext>
-            </a:extLst>
-          </p:cNvPr>
-          <p:cNvPicPr>
-            <a:picLocks noChangeAspect="1"/>
-          </p:cNvPicPr>
-          <p:nvPr/>
-        </p:nvPicPr>
-        <p:blipFill>
-          <a:blip r:embed="rId2"/>
-          <a:stretch>
-            <a:fillRect/>
-          </a:stretch>
-        </p:blipFill>
-        <p:spPr>
-          <a:xfrm>
-            <a:off x="1177179" y="2504164"/>
-            <a:ext cx="8401050" cy="704850"/>
-          </a:xfrm>
-          <a:prstGeom prst="rect">
-            <a:avLst/>
-          </a:prstGeom>
-        </p:spPr>
-      </p:pic>
-      <p:grpSp>
-        <p:nvGrpSpPr>
-          <p:cNvPr id="7" name="Group 6">
-            <a:extLst>
-              <a:ext uri="{FF2B5EF4-FFF2-40B4-BE49-F238E27FC236}">
-                <a16:creationId xmlns:a16="http://schemas.microsoft.com/office/drawing/2014/main" id="{9FCCC6C8-F5CA-494B-97D4-DF5EED3EFDAB}"/>
-              </a:ext>
-            </a:extLst>
-          </p:cNvPr>
-          <p:cNvGrpSpPr/>
-          <p:nvPr/>
-        </p:nvGrpSpPr>
-        <p:grpSpPr>
-          <a:xfrm>
-            <a:off x="1097280" y="3598271"/>
-            <a:ext cx="2708799" cy="1390979"/>
-            <a:chOff x="1097280" y="3598271"/>
-            <a:chExt cx="2708799" cy="1390979"/>
-          </a:xfrm>
-        </p:grpSpPr>
-        <p:pic>
-          <p:nvPicPr>
-            <p:cNvPr id="5" name="Picture 4">
-              <a:extLst>
-                <a:ext uri="{FF2B5EF4-FFF2-40B4-BE49-F238E27FC236}">
-                  <a16:creationId xmlns:a16="http://schemas.microsoft.com/office/drawing/2014/main" id="{BDA43AE2-2F09-4299-86E5-7C5CA1F25107}"/>
-                </a:ext>
-              </a:extLst>
-            </p:cNvPr>
-            <p:cNvPicPr>
-              <a:picLocks noChangeAspect="1"/>
-            </p:cNvPicPr>
-            <p:nvPr/>
-          </p:nvPicPr>
-          <p:blipFill rotWithShape="1">
-            <a:blip r:embed="rId3"/>
-            <a:srcRect l="338" t="5673" r="-338" b="57385"/>
-            <a:stretch/>
-          </p:blipFill>
-          <p:spPr>
-            <a:xfrm>
-              <a:off x="1177179" y="3975818"/>
-              <a:ext cx="2628900" cy="1013432"/>
-            </a:xfrm>
-            <a:prstGeom prst="rect">
-              <a:avLst/>
-            </a:prstGeom>
-          </p:spPr>
-        </p:pic>
-        <p:sp>
-          <p:nvSpPr>
-            <p:cNvPr id="6" name="Content Placeholder 2">
-              <a:extLst>
-                <a:ext uri="{FF2B5EF4-FFF2-40B4-BE49-F238E27FC236}">
-                  <a16:creationId xmlns:a16="http://schemas.microsoft.com/office/drawing/2014/main" id="{5BE7C1C9-F54D-4A9D-941E-1360654145A0}"/>
-                </a:ext>
-              </a:extLst>
-            </p:cNvPr>
-            <p:cNvSpPr txBox="1">
-              <a:spLocks/>
-            </p:cNvSpPr>
-            <p:nvPr/>
-          </p:nvSpPr>
-          <p:spPr>
-            <a:xfrm>
-              <a:off x="1097280" y="3598271"/>
-              <a:ext cx="2205213" cy="377547"/>
-            </a:xfrm>
-            <a:prstGeom prst="rect">
-              <a:avLst/>
-            </a:prstGeom>
-          </p:spPr>
-          <p:txBody>
-            <a:bodyPr vert="horz" lIns="0" tIns="45720" rIns="0" bIns="45720" rtlCol="0">
-              <a:normAutofit fontScale="85000" lnSpcReduction="10000"/>
-            </a:bodyPr>
-            <a:lstStyle>
-              <a:lvl1pPr marL="91440" indent="-91440" algn="l" defTabSz="914400" rtl="0" eaLnBrk="1" latinLnBrk="0" hangingPunct="1">
-                <a:lnSpc>
-                  <a:spcPct val="100000"/>
-                </a:lnSpc>
-                <a:spcBef>
-                  <a:spcPts val="1200"/>
-                </a:spcBef>
-                <a:spcAft>
-                  <a:spcPts val="200"/>
-                </a:spcAft>
-                <a:buClr>
-                  <a:schemeClr val="accent1"/>
-                </a:buClr>
-                <a:buSzPct val="100000"/>
-                <a:buFont typeface="Calibri" panose="020F0502020204030204" pitchFamily="34" charset="0"/>
-                <a:buChar char=" "/>
-                <a:defRPr sz="2000" kern="1200">
-                  <a:solidFill>
-                    <a:schemeClr val="tx1">
-                      <a:lumMod val="75000"/>
-                      <a:lumOff val="25000"/>
-                    </a:schemeClr>
-                  </a:solidFill>
-                  <a:latin typeface="+mn-lt"/>
-                  <a:ea typeface="+mn-ea"/>
-                  <a:cs typeface="+mn-cs"/>
-                </a:defRPr>
-              </a:lvl1pPr>
-              <a:lvl2pPr marL="384048" indent="-182880" algn="l" defTabSz="914400" rtl="0" eaLnBrk="1" latinLnBrk="0" hangingPunct="1">
-                <a:lnSpc>
-                  <a:spcPct val="100000"/>
-                </a:lnSpc>
-                <a:spcBef>
-                  <a:spcPts val="200"/>
-                </a:spcBef>
-                <a:spcAft>
-                  <a:spcPts val="400"/>
-                </a:spcAft>
-                <a:buClrTx/>
-                <a:buFont typeface="Calibri" pitchFamily="34" charset="0"/>
-                <a:buChar char="◦"/>
-                <a:defRPr sz="1800" kern="1200">
-                  <a:solidFill>
-                    <a:schemeClr val="tx1">
-                      <a:lumMod val="75000"/>
-                      <a:lumOff val="25000"/>
-                    </a:schemeClr>
-                  </a:solidFill>
-                  <a:latin typeface="+mn-lt"/>
-                  <a:ea typeface="+mn-ea"/>
-                  <a:cs typeface="+mn-cs"/>
-                </a:defRPr>
-              </a:lvl2pPr>
-              <a:lvl3pPr marL="566928" indent="-182880" algn="l" defTabSz="914400" rtl="0" eaLnBrk="1" latinLnBrk="0" hangingPunct="1">
-                <a:lnSpc>
-                  <a:spcPct val="100000"/>
-                </a:lnSpc>
-                <a:spcBef>
-                  <a:spcPts val="200"/>
-                </a:spcBef>
-                <a:spcAft>
-                  <a:spcPts val="400"/>
-                </a:spcAft>
-                <a:buClrTx/>
-                <a:buFont typeface="Calibri" pitchFamily="34" charset="0"/>
-                <a:buChar char="◦"/>
-                <a:defRPr sz="1400" kern="1200">
-                  <a:solidFill>
-                    <a:schemeClr val="tx1">
-                      <a:lumMod val="75000"/>
-                      <a:lumOff val="25000"/>
-                    </a:schemeClr>
-                  </a:solidFill>
-                  <a:latin typeface="+mn-lt"/>
-                  <a:ea typeface="+mn-ea"/>
-                  <a:cs typeface="+mn-cs"/>
-                </a:defRPr>
-              </a:lvl3pPr>
-              <a:lvl4pPr marL="749808" indent="-182880" algn="l" defTabSz="914400" rtl="0" eaLnBrk="1" latinLnBrk="0" hangingPunct="1">
-                <a:lnSpc>
-                  <a:spcPct val="100000"/>
-                </a:lnSpc>
-                <a:spcBef>
-                  <a:spcPts val="200"/>
-                </a:spcBef>
-                <a:spcAft>
-                  <a:spcPts val="400"/>
-                </a:spcAft>
-                <a:buClrTx/>
-                <a:buFont typeface="Calibri" pitchFamily="34" charset="0"/>
-                <a:buChar char="◦"/>
-                <a:defRPr sz="1400" kern="1200">
-                  <a:solidFill>
-                    <a:schemeClr val="tx1">
-                      <a:lumMod val="75000"/>
-                      <a:lumOff val="25000"/>
-                    </a:schemeClr>
-                  </a:solidFill>
-                  <a:latin typeface="+mn-lt"/>
-                  <a:ea typeface="+mn-ea"/>
-                  <a:cs typeface="+mn-cs"/>
-                </a:defRPr>
-              </a:lvl4pPr>
-              <a:lvl5pPr marL="932688" indent="-182880" algn="l" defTabSz="914400" rtl="0" eaLnBrk="1" latinLnBrk="0" hangingPunct="1">
-                <a:lnSpc>
-                  <a:spcPct val="100000"/>
-                </a:lnSpc>
-                <a:spcBef>
-                  <a:spcPts val="200"/>
-                </a:spcBef>
-                <a:spcAft>
-                  <a:spcPts val="400"/>
-                </a:spcAft>
-                <a:buClrTx/>
-                <a:buFont typeface="Calibri" pitchFamily="34" charset="0"/>
-                <a:buChar char="◦"/>
-                <a:defRPr sz="1400" kern="1200">
-                  <a:solidFill>
-                    <a:schemeClr val="tx1">
-                      <a:lumMod val="75000"/>
-                      <a:lumOff val="25000"/>
-                    </a:schemeClr>
-                  </a:solidFill>
-                  <a:latin typeface="+mn-lt"/>
-                  <a:ea typeface="+mn-ea"/>
-                  <a:cs typeface="+mn-cs"/>
-                </a:defRPr>
-              </a:lvl5pPr>
-              <a:lvl6pPr marL="1100000" indent="-228600" algn="l" defTabSz="914400" rtl="0" eaLnBrk="1" latinLnBrk="0" hangingPunct="1">
-                <a:lnSpc>
-                  <a:spcPct val="90000"/>
-                </a:lnSpc>
-                <a:spcBef>
-                  <a:spcPts val="200"/>
-                </a:spcBef>
-                <a:spcAft>
-                  <a:spcPts val="400"/>
-                </a:spcAft>
-                <a:buClr>
-                  <a:schemeClr val="accent1"/>
-                </a:buClr>
-                <a:buFont typeface="Calibri" pitchFamily="34" charset="0"/>
-                <a:buChar char="◦"/>
-                <a:defRPr sz="1400" kern="1200">
-                  <a:solidFill>
-                    <a:schemeClr val="tx1">
-                      <a:lumMod val="75000"/>
-                      <a:lumOff val="25000"/>
-                    </a:schemeClr>
-                  </a:solidFill>
-                  <a:latin typeface="+mn-lt"/>
-                  <a:ea typeface="+mn-ea"/>
-                  <a:cs typeface="+mn-cs"/>
-                </a:defRPr>
-              </a:lvl6pPr>
-              <a:lvl7pPr marL="1300000" indent="-228600" algn="l" defTabSz="914400" rtl="0" eaLnBrk="1" latinLnBrk="0" hangingPunct="1">
-                <a:lnSpc>
-                  <a:spcPct val="90000"/>
-                </a:lnSpc>
-                <a:spcBef>
-                  <a:spcPts val="200"/>
-                </a:spcBef>
-                <a:spcAft>
-                  <a:spcPts val="400"/>
-                </a:spcAft>
-                <a:buClr>
-                  <a:schemeClr val="accent1"/>
-                </a:buClr>
-                <a:buFont typeface="Calibri" pitchFamily="34" charset="0"/>
-                <a:buChar char="◦"/>
-                <a:defRPr sz="1400" kern="1200">
-                  <a:solidFill>
-                    <a:schemeClr val="tx1">
-                      <a:lumMod val="75000"/>
-                      <a:lumOff val="25000"/>
-                    </a:schemeClr>
-                  </a:solidFill>
-                  <a:latin typeface="+mn-lt"/>
-                  <a:ea typeface="+mn-ea"/>
-                  <a:cs typeface="+mn-cs"/>
-                </a:defRPr>
-              </a:lvl7pPr>
-              <a:lvl8pPr marL="1500000" indent="-228600" algn="l" defTabSz="914400" rtl="0" eaLnBrk="1" latinLnBrk="0" hangingPunct="1">
-                <a:lnSpc>
-                  <a:spcPct val="90000"/>
-                </a:lnSpc>
-                <a:spcBef>
-                  <a:spcPts val="200"/>
-                </a:spcBef>
-                <a:spcAft>
-                  <a:spcPts val="400"/>
-                </a:spcAft>
-                <a:buClr>
-                  <a:schemeClr val="accent1"/>
-                </a:buClr>
-                <a:buFont typeface="Calibri" pitchFamily="34" charset="0"/>
-                <a:buChar char="◦"/>
-                <a:defRPr sz="1400" kern="1200">
-                  <a:solidFill>
-                    <a:schemeClr val="tx1">
-                      <a:lumMod val="75000"/>
-                      <a:lumOff val="25000"/>
-                    </a:schemeClr>
-                  </a:solidFill>
-                  <a:latin typeface="+mn-lt"/>
-                  <a:ea typeface="+mn-ea"/>
-                  <a:cs typeface="+mn-cs"/>
-                </a:defRPr>
-              </a:lvl8pPr>
-              <a:lvl9pPr marL="1700000" indent="-228600" algn="l" defTabSz="914400" rtl="0" eaLnBrk="1" latinLnBrk="0" hangingPunct="1">
-                <a:lnSpc>
-                  <a:spcPct val="90000"/>
-                </a:lnSpc>
-                <a:spcBef>
-                  <a:spcPts val="200"/>
-                </a:spcBef>
-                <a:spcAft>
-                  <a:spcPts val="400"/>
-                </a:spcAft>
-                <a:buClr>
-                  <a:schemeClr val="accent1"/>
-                </a:buClr>
-                <a:buFont typeface="Calibri" pitchFamily="34" charset="0"/>
-                <a:buChar char="◦"/>
-                <a:defRPr sz="1400" kern="1200">
-                  <a:solidFill>
-                    <a:schemeClr val="tx1">
-                      <a:lumMod val="75000"/>
-                      <a:lumOff val="25000"/>
-                    </a:schemeClr>
-                  </a:solidFill>
-                  <a:latin typeface="+mn-lt"/>
-                  <a:ea typeface="+mn-ea"/>
-                  <a:cs typeface="+mn-cs"/>
-                </a:defRPr>
-              </a:lvl9pPr>
-            </a:lstStyle>
-            <a:p>
-              <a:r>
-                <a:rPr lang="en-GB" dirty="0"/>
-                <a:t>Frequent Itemsets List</a:t>
-              </a:r>
-            </a:p>
-          </p:txBody>
-        </p:sp>
-      </p:grpSp>
+              <a:rPr lang="en-GB" sz="4400" b="1" dirty="0"/>
+              <a:t>Results  -  Grocery Shopping Association Rules</a:t>
+            </a:r>
+          </a:p>
+        </p:txBody>
+      </p:sp>
       <p:grpSp>
         <p:nvGrpSpPr>
           <p:cNvPr id="10" name="Group 9">
@@ -6176,7 +6436,7 @@
         </p:nvGrpSpPr>
         <p:grpSpPr>
           <a:xfrm>
-            <a:off x="4544794" y="3787044"/>
+            <a:off x="1230666" y="4325185"/>
             <a:ext cx="5712447" cy="884263"/>
             <a:chOff x="4420507" y="3598271"/>
             <a:chExt cx="5712447" cy="884263"/>
@@ -6197,7 +6457,7 @@
             <p:nvPr/>
           </p:nvPicPr>
           <p:blipFill>
-            <a:blip r:embed="rId4"/>
+            <a:blip r:embed="rId3"/>
             <a:stretch>
               <a:fillRect/>
             </a:stretch>
@@ -6486,6 +6746,322 @@
           </p:txBody>
         </p:sp>
       </p:grpSp>
+      <p:pic>
+        <p:nvPicPr>
+          <p:cNvPr id="12" name="Picture 11">
+            <a:extLst>
+              <a:ext uri="{FF2B5EF4-FFF2-40B4-BE49-F238E27FC236}">
+                <a16:creationId xmlns:a16="http://schemas.microsoft.com/office/drawing/2014/main" id="{F14489EF-3042-4698-864D-C78BA5C66ABB}"/>
+              </a:ext>
+            </a:extLst>
+          </p:cNvPr>
+          <p:cNvPicPr>
+            <a:picLocks noChangeAspect="1"/>
+          </p:cNvPicPr>
+          <p:nvPr/>
+        </p:nvPicPr>
+        <p:blipFill rotWithShape="1">
+          <a:blip r:embed="rId4"/>
+          <a:srcRect l="272" t="533" r="304"/>
+          <a:stretch/>
+        </p:blipFill>
+        <p:spPr>
+          <a:xfrm>
+            <a:off x="7954281" y="2235104"/>
+            <a:ext cx="3731830" cy="2090081"/>
+          </a:xfrm>
+          <a:prstGeom prst="rect">
+            <a:avLst/>
+          </a:prstGeom>
+        </p:spPr>
+      </p:pic>
+      <p:sp>
+        <p:nvSpPr>
+          <p:cNvPr id="13" name="Content Placeholder 2">
+            <a:extLst>
+              <a:ext uri="{FF2B5EF4-FFF2-40B4-BE49-F238E27FC236}">
+                <a16:creationId xmlns:a16="http://schemas.microsoft.com/office/drawing/2014/main" id="{79D7104A-A2B3-442A-A701-4D842F532753}"/>
+              </a:ext>
+            </a:extLst>
+          </p:cNvPr>
+          <p:cNvSpPr txBox="1">
+            <a:spLocks/>
+          </p:cNvSpPr>
+          <p:nvPr/>
+        </p:nvSpPr>
+        <p:spPr>
+          <a:xfrm>
+            <a:off x="1230666" y="2219615"/>
+            <a:ext cx="6200165" cy="1630166"/>
+          </a:xfrm>
+          <a:prstGeom prst="rect">
+            <a:avLst/>
+          </a:prstGeom>
+        </p:spPr>
+        <p:txBody>
+          <a:bodyPr vert="horz" lIns="0" tIns="45720" rIns="0" bIns="45720" rtlCol="0">
+            <a:normAutofit/>
+          </a:bodyPr>
+          <a:lstStyle>
+            <a:lvl1pPr marL="91440" indent="-91440" algn="l" defTabSz="914400" rtl="0" eaLnBrk="1" latinLnBrk="0" hangingPunct="1">
+              <a:lnSpc>
+                <a:spcPct val="100000"/>
+              </a:lnSpc>
+              <a:spcBef>
+                <a:spcPts val="1200"/>
+              </a:spcBef>
+              <a:spcAft>
+                <a:spcPts val="200"/>
+              </a:spcAft>
+              <a:buClr>
+                <a:schemeClr val="accent1"/>
+              </a:buClr>
+              <a:buSzPct val="100000"/>
+              <a:buFont typeface="Calibri" panose="020F0502020204030204" pitchFamily="34" charset="0"/>
+              <a:buChar char=" "/>
+              <a:defRPr sz="2000" kern="1200">
+                <a:solidFill>
+                  <a:schemeClr val="tx1">
+                    <a:lumMod val="75000"/>
+                    <a:lumOff val="25000"/>
+                  </a:schemeClr>
+                </a:solidFill>
+                <a:latin typeface="+mn-lt"/>
+                <a:ea typeface="+mn-ea"/>
+                <a:cs typeface="+mn-cs"/>
+              </a:defRPr>
+            </a:lvl1pPr>
+            <a:lvl2pPr marL="384048" indent="-182880" algn="l" defTabSz="914400" rtl="0" eaLnBrk="1" latinLnBrk="0" hangingPunct="1">
+              <a:lnSpc>
+                <a:spcPct val="100000"/>
+              </a:lnSpc>
+              <a:spcBef>
+                <a:spcPts val="200"/>
+              </a:spcBef>
+              <a:spcAft>
+                <a:spcPts val="400"/>
+              </a:spcAft>
+              <a:buClrTx/>
+              <a:buFont typeface="Calibri" pitchFamily="34" charset="0"/>
+              <a:buChar char="◦"/>
+              <a:defRPr sz="1800" kern="1200">
+                <a:solidFill>
+                  <a:schemeClr val="tx1">
+                    <a:lumMod val="75000"/>
+                    <a:lumOff val="25000"/>
+                  </a:schemeClr>
+                </a:solidFill>
+                <a:latin typeface="+mn-lt"/>
+                <a:ea typeface="+mn-ea"/>
+                <a:cs typeface="+mn-cs"/>
+              </a:defRPr>
+            </a:lvl2pPr>
+            <a:lvl3pPr marL="566928" indent="-182880" algn="l" defTabSz="914400" rtl="0" eaLnBrk="1" latinLnBrk="0" hangingPunct="1">
+              <a:lnSpc>
+                <a:spcPct val="100000"/>
+              </a:lnSpc>
+              <a:spcBef>
+                <a:spcPts val="200"/>
+              </a:spcBef>
+              <a:spcAft>
+                <a:spcPts val="400"/>
+              </a:spcAft>
+              <a:buClrTx/>
+              <a:buFont typeface="Calibri" pitchFamily="34" charset="0"/>
+              <a:buChar char="◦"/>
+              <a:defRPr sz="1400" kern="1200">
+                <a:solidFill>
+                  <a:schemeClr val="tx1">
+                    <a:lumMod val="75000"/>
+                    <a:lumOff val="25000"/>
+                  </a:schemeClr>
+                </a:solidFill>
+                <a:latin typeface="+mn-lt"/>
+                <a:ea typeface="+mn-ea"/>
+                <a:cs typeface="+mn-cs"/>
+              </a:defRPr>
+            </a:lvl3pPr>
+            <a:lvl4pPr marL="749808" indent="-182880" algn="l" defTabSz="914400" rtl="0" eaLnBrk="1" latinLnBrk="0" hangingPunct="1">
+              <a:lnSpc>
+                <a:spcPct val="100000"/>
+              </a:lnSpc>
+              <a:spcBef>
+                <a:spcPts val="200"/>
+              </a:spcBef>
+              <a:spcAft>
+                <a:spcPts val="400"/>
+              </a:spcAft>
+              <a:buClrTx/>
+              <a:buFont typeface="Calibri" pitchFamily="34" charset="0"/>
+              <a:buChar char="◦"/>
+              <a:defRPr sz="1400" kern="1200">
+                <a:solidFill>
+                  <a:schemeClr val="tx1">
+                    <a:lumMod val="75000"/>
+                    <a:lumOff val="25000"/>
+                  </a:schemeClr>
+                </a:solidFill>
+                <a:latin typeface="+mn-lt"/>
+                <a:ea typeface="+mn-ea"/>
+                <a:cs typeface="+mn-cs"/>
+              </a:defRPr>
+            </a:lvl4pPr>
+            <a:lvl5pPr marL="932688" indent="-182880" algn="l" defTabSz="914400" rtl="0" eaLnBrk="1" latinLnBrk="0" hangingPunct="1">
+              <a:lnSpc>
+                <a:spcPct val="100000"/>
+              </a:lnSpc>
+              <a:spcBef>
+                <a:spcPts val="200"/>
+              </a:spcBef>
+              <a:spcAft>
+                <a:spcPts val="400"/>
+              </a:spcAft>
+              <a:buClrTx/>
+              <a:buFont typeface="Calibri" pitchFamily="34" charset="0"/>
+              <a:buChar char="◦"/>
+              <a:defRPr sz="1400" kern="1200">
+                <a:solidFill>
+                  <a:schemeClr val="tx1">
+                    <a:lumMod val="75000"/>
+                    <a:lumOff val="25000"/>
+                  </a:schemeClr>
+                </a:solidFill>
+                <a:latin typeface="+mn-lt"/>
+                <a:ea typeface="+mn-ea"/>
+                <a:cs typeface="+mn-cs"/>
+              </a:defRPr>
+            </a:lvl5pPr>
+            <a:lvl6pPr marL="1100000" indent="-228600" algn="l" defTabSz="914400" rtl="0" eaLnBrk="1" latinLnBrk="0" hangingPunct="1">
+              <a:lnSpc>
+                <a:spcPct val="90000"/>
+              </a:lnSpc>
+              <a:spcBef>
+                <a:spcPts val="200"/>
+              </a:spcBef>
+              <a:spcAft>
+                <a:spcPts val="400"/>
+              </a:spcAft>
+              <a:buClr>
+                <a:schemeClr val="accent1"/>
+              </a:buClr>
+              <a:buFont typeface="Calibri" pitchFamily="34" charset="0"/>
+              <a:buChar char="◦"/>
+              <a:defRPr sz="1400" kern="1200">
+                <a:solidFill>
+                  <a:schemeClr val="tx1">
+                    <a:lumMod val="75000"/>
+                    <a:lumOff val="25000"/>
+                  </a:schemeClr>
+                </a:solidFill>
+                <a:latin typeface="+mn-lt"/>
+                <a:ea typeface="+mn-ea"/>
+                <a:cs typeface="+mn-cs"/>
+              </a:defRPr>
+            </a:lvl6pPr>
+            <a:lvl7pPr marL="1300000" indent="-228600" algn="l" defTabSz="914400" rtl="0" eaLnBrk="1" latinLnBrk="0" hangingPunct="1">
+              <a:lnSpc>
+                <a:spcPct val="90000"/>
+              </a:lnSpc>
+              <a:spcBef>
+                <a:spcPts val="200"/>
+              </a:spcBef>
+              <a:spcAft>
+                <a:spcPts val="400"/>
+              </a:spcAft>
+              <a:buClr>
+                <a:schemeClr val="accent1"/>
+              </a:buClr>
+              <a:buFont typeface="Calibri" pitchFamily="34" charset="0"/>
+              <a:buChar char="◦"/>
+              <a:defRPr sz="1400" kern="1200">
+                <a:solidFill>
+                  <a:schemeClr val="tx1">
+                    <a:lumMod val="75000"/>
+                    <a:lumOff val="25000"/>
+                  </a:schemeClr>
+                </a:solidFill>
+                <a:latin typeface="+mn-lt"/>
+                <a:ea typeface="+mn-ea"/>
+                <a:cs typeface="+mn-cs"/>
+              </a:defRPr>
+            </a:lvl7pPr>
+            <a:lvl8pPr marL="1500000" indent="-228600" algn="l" defTabSz="914400" rtl="0" eaLnBrk="1" latinLnBrk="0" hangingPunct="1">
+              <a:lnSpc>
+                <a:spcPct val="90000"/>
+              </a:lnSpc>
+              <a:spcBef>
+                <a:spcPts val="200"/>
+              </a:spcBef>
+              <a:spcAft>
+                <a:spcPts val="400"/>
+              </a:spcAft>
+              <a:buClr>
+                <a:schemeClr val="accent1"/>
+              </a:buClr>
+              <a:buFont typeface="Calibri" pitchFamily="34" charset="0"/>
+              <a:buChar char="◦"/>
+              <a:defRPr sz="1400" kern="1200">
+                <a:solidFill>
+                  <a:schemeClr val="tx1">
+                    <a:lumMod val="75000"/>
+                    <a:lumOff val="25000"/>
+                  </a:schemeClr>
+                </a:solidFill>
+                <a:latin typeface="+mn-lt"/>
+                <a:ea typeface="+mn-ea"/>
+                <a:cs typeface="+mn-cs"/>
+              </a:defRPr>
+            </a:lvl8pPr>
+            <a:lvl9pPr marL="1700000" indent="-228600" algn="l" defTabSz="914400" rtl="0" eaLnBrk="1" latinLnBrk="0" hangingPunct="1">
+              <a:lnSpc>
+                <a:spcPct val="90000"/>
+              </a:lnSpc>
+              <a:spcBef>
+                <a:spcPts val="200"/>
+              </a:spcBef>
+              <a:spcAft>
+                <a:spcPts val="400"/>
+              </a:spcAft>
+              <a:buClr>
+                <a:schemeClr val="accent1"/>
+              </a:buClr>
+              <a:buFont typeface="Calibri" pitchFamily="34" charset="0"/>
+              <a:buChar char="◦"/>
+              <a:defRPr sz="1400" kern="1200">
+                <a:solidFill>
+                  <a:schemeClr val="tx1">
+                    <a:lumMod val="75000"/>
+                    <a:lumOff val="25000"/>
+                  </a:schemeClr>
+                </a:solidFill>
+                <a:latin typeface="+mn-lt"/>
+                <a:ea typeface="+mn-ea"/>
+                <a:cs typeface="+mn-cs"/>
+              </a:defRPr>
+            </a:lvl9pPr>
+          </a:lstStyle>
+          <a:p>
+            <a:pPr>
+              <a:buFont typeface="Wingdings" panose="05000000000000000000" pitchFamily="2" charset="2"/>
+              <a:buChar char="Ø"/>
+            </a:pPr>
+            <a:r>
+              <a:rPr lang="en-GB" sz="1600" dirty="0"/>
+              <a:t>  169 unique items, with highest frequency 2513 for whole milk and lowest frequency – 1 for baby food. </a:t>
+            </a:r>
+          </a:p>
+          <a:p>
+            <a:pPr>
+              <a:buFont typeface="Wingdings" panose="05000000000000000000" pitchFamily="2" charset="2"/>
+              <a:buChar char="Ø"/>
+            </a:pPr>
+            <a:r>
+              <a:rPr lang="en-GB" sz="1600" dirty="0"/>
+              <a:t>  When given 10% relative support and 10% confidence barrier, the lowest support that passes the boundary is 736, with 86 unique itemsets and 66 unique associations between them. </a:t>
+            </a:r>
+          </a:p>
+        </p:txBody>
+      </p:sp>
     </p:spTree>
     <p:extLst>
       <p:ext uri="{BB962C8B-B14F-4D97-AF65-F5344CB8AC3E}">
@@ -6532,14 +7108,19 @@
             <p:ph type="title"/>
           </p:nvPr>
         </p:nvSpPr>
-        <p:spPr/>
+        <p:spPr>
+          <a:xfrm>
+            <a:off x="1097280" y="263529"/>
+            <a:ext cx="10058400" cy="1450757"/>
+          </a:xfrm>
+        </p:spPr>
         <p:txBody>
           <a:bodyPr/>
           <a:lstStyle/>
           <a:p>
             <a:r>
-              <a:rPr lang="en-GB" dirty="0"/>
-              <a:t>Algorithm</a:t>
+              <a:rPr lang="en-GB" b="1" dirty="0"/>
+              <a:t>Collaborative Filtering</a:t>
             </a:r>
           </a:p>
         </p:txBody>
@@ -6586,28 +7167,7 @@
                 <a:latin typeface="Arial" panose="020B0604020202020204" pitchFamily="34" charset="0"/>
                 <a:cs typeface="Arial" panose="020B0604020202020204" pitchFamily="34" charset="0"/>
               </a:rPr>
-              <a:t>(Library) – Victor Essien, Nour </a:t>
-            </a:r>
-            <a:r>
-              <a:rPr lang="en-GB" b="1" i="1" dirty="0" err="1">
-                <a:latin typeface="Arial" panose="020B0604020202020204" pitchFamily="34" charset="0"/>
-                <a:cs typeface="Arial" panose="020B0604020202020204" pitchFamily="34" charset="0"/>
-              </a:rPr>
-              <a:t>Aldin</a:t>
-            </a:r>
-            <a:r>
-              <a:rPr lang="en-GB" b="1" i="1" dirty="0">
-                <a:latin typeface="Arial" panose="020B0604020202020204" pitchFamily="34" charset="0"/>
-                <a:cs typeface="Arial" panose="020B0604020202020204" pitchFamily="34" charset="0"/>
-              </a:rPr>
-              <a:t> </a:t>
-            </a:r>
-            <a:r>
-              <a:rPr lang="en-GB" b="1" i="1" dirty="0" err="1">
-                <a:latin typeface="Arial" panose="020B0604020202020204" pitchFamily="34" charset="0"/>
-                <a:cs typeface="Arial" panose="020B0604020202020204" pitchFamily="34" charset="0"/>
-              </a:rPr>
-              <a:t>Almubarak</a:t>
+              <a:t>(Library)</a:t>
             </a:r>
             <a:endParaRPr lang="en-GB" b="1" dirty="0">
               <a:latin typeface="Arial" panose="020B0604020202020204" pitchFamily="34" charset="0"/>
@@ -6711,7 +7271,7 @@
           <a:lstStyle/>
           <a:p>
             <a:r>
-              <a:rPr lang="en-GB" dirty="0"/>
+              <a:rPr lang="en-GB" b="1" dirty="0"/>
               <a:t>Questions</a:t>
             </a:r>
           </a:p>
@@ -6814,8 +7374,8 @@
           <a:lstStyle/>
           <a:p>
             <a:r>
-              <a:rPr lang="en-GB" dirty="0"/>
-              <a:t>Results</a:t>
+              <a:rPr lang="en-GB" b="1" dirty="0"/>
+              <a:t>Results – Movie Ratings</a:t>
             </a:r>
           </a:p>
         </p:txBody>

</xml_diff>